<commit_message>
po meeting  presentatie 2
</commit_message>
<xml_diff>
--- a/documentatie/po presentaties/PO meet 2.pptx
+++ b/documentatie/po presentaties/PO meet 2.pptx
@@ -5,22 +5,26 @@
     <p:sldMasterId id="2147483672" r:id="rId1"/>
   </p:sldMasterIdLst>
   <p:notesMasterIdLst>
-    <p:notesMasterId r:id="rId12"/>
+    <p:notesMasterId r:id="rId16"/>
   </p:notesMasterIdLst>
   <p:handoutMasterIdLst>
-    <p:handoutMasterId r:id="rId13"/>
+    <p:handoutMasterId r:id="rId17"/>
   </p:handoutMasterIdLst>
   <p:sldIdLst>
     <p:sldId id="256" r:id="rId2"/>
     <p:sldId id="261" r:id="rId3"/>
     <p:sldId id="259" r:id="rId4"/>
     <p:sldId id="262" r:id="rId5"/>
-    <p:sldId id="263" r:id="rId6"/>
-    <p:sldId id="264" r:id="rId7"/>
-    <p:sldId id="265" r:id="rId8"/>
-    <p:sldId id="266" r:id="rId9"/>
-    <p:sldId id="267" r:id="rId10"/>
-    <p:sldId id="268" r:id="rId11"/>
+    <p:sldId id="277" r:id="rId6"/>
+    <p:sldId id="271" r:id="rId7"/>
+    <p:sldId id="272" r:id="rId8"/>
+    <p:sldId id="273" r:id="rId9"/>
+    <p:sldId id="274" r:id="rId10"/>
+    <p:sldId id="280" r:id="rId11"/>
+    <p:sldId id="275" r:id="rId12"/>
+    <p:sldId id="276" r:id="rId13"/>
+    <p:sldId id="278" r:id="rId14"/>
+    <p:sldId id="279" r:id="rId15"/>
   </p:sldIdLst>
   <p:sldSz cx="12192000" cy="6858000"/>
   <p:notesSz cx="6858000" cy="9144000"/>
@@ -226,7 +230,7 @@
             <a:pPr rtl="0"/>
             <a:fld id="{3D95C7D2-ABF9-47D5-A466-C024D5C5A4EE}" type="datetime1">
               <a:rPr lang="nl-NL" smtClean="0"/>
-              <a:t>13-3-2025</a:t>
+              <a:t>20-3-2025</a:t>
             </a:fld>
             <a:endParaRPr lang="nl-NL"/>
           </a:p>
@@ -408,7 +412,7 @@
             <a:pPr rtl="0"/>
             <a:fld id="{A72C4D06-A9D8-4A2A-8BD7-6476B55DB23D}" type="datetime1">
               <a:rPr lang="nl-NL" noProof="0" smtClean="0"/>
-              <a:t>13-3-2025</a:t>
+              <a:t>20-3-2025</a:t>
             </a:fld>
             <a:endParaRPr lang="nl-NL" noProof="0"/>
           </a:p>
@@ -765,6 +769,350 @@
 </p:notes>
 </file>
 
+<file path=ppt/notesSlides/notesSlide10.xml><?xml version="1.0" encoding="utf-8"?>
+<p:notes xmlns:a="http://schemas.openxmlformats.org/drawingml/2006/main" xmlns:r="http://schemas.openxmlformats.org/officeDocument/2006/relationships" xmlns:p="http://schemas.openxmlformats.org/presentationml/2006/main">
+  <p:cSld>
+    <p:spTree>
+      <p:nvGrpSpPr>
+        <p:cNvPr id="1" name=""/>
+        <p:cNvGrpSpPr/>
+        <p:nvPr/>
+      </p:nvGrpSpPr>
+      <p:grpSpPr>
+        <a:xfrm>
+          <a:off x="0" y="0"/>
+          <a:ext cx="0" cy="0"/>
+          <a:chOff x="0" y="0"/>
+          <a:chExt cx="0" cy="0"/>
+        </a:xfrm>
+      </p:grpSpPr>
+      <p:sp>
+        <p:nvSpPr>
+          <p:cNvPr id="2" name="Tijdelijke aanduiding voor dia-afbeelding 1"/>
+          <p:cNvSpPr>
+            <a:spLocks noGrp="1" noRot="1" noChangeAspect="1"/>
+          </p:cNvSpPr>
+          <p:nvPr>
+            <p:ph type="sldImg"/>
+          </p:nvPr>
+        </p:nvSpPr>
+        <p:spPr/>
+      </p:sp>
+      <p:sp>
+        <p:nvSpPr>
+          <p:cNvPr id="3" name="Tijdelijke aanduiding voor notities 2"/>
+          <p:cNvSpPr>
+            <a:spLocks noGrp="1"/>
+          </p:cNvSpPr>
+          <p:nvPr>
+            <p:ph type="body" idx="1"/>
+          </p:nvPr>
+        </p:nvSpPr>
+        <p:spPr/>
+        <p:txBody>
+          <a:bodyPr rtlCol="0"/>
+          <a:lstStyle/>
+          <a:p>
+            <a:pPr rtl="0"/>
+            <a:endParaRPr lang="nl-NL"/>
+          </a:p>
+        </p:txBody>
+      </p:sp>
+      <p:sp>
+        <p:nvSpPr>
+          <p:cNvPr id="4" name="Tijdelijke aanduiding voor dianummer 3"/>
+          <p:cNvSpPr>
+            <a:spLocks noGrp="1"/>
+          </p:cNvSpPr>
+          <p:nvPr>
+            <p:ph type="sldNum" sz="quarter" idx="5"/>
+          </p:nvPr>
+        </p:nvSpPr>
+        <p:spPr/>
+        <p:txBody>
+          <a:bodyPr rtlCol="0"/>
+          <a:lstStyle/>
+          <a:p>
+            <a:pPr rtl="0"/>
+            <a:fld id="{C6B3AB32-59DF-41F1-9618-EDFBF5049629}" type="slidenum">
+              <a:rPr lang="nl-NL" smtClean="0"/>
+              <a:t>11</a:t>
+            </a:fld>
+            <a:endParaRPr lang="nl-NL"/>
+          </a:p>
+        </p:txBody>
+      </p:sp>
+    </p:spTree>
+    <p:extLst>
+      <p:ext uri="{BB962C8B-B14F-4D97-AF65-F5344CB8AC3E}">
+        <p14:creationId xmlns:p14="http://schemas.microsoft.com/office/powerpoint/2010/main" val="3267616230"/>
+      </p:ext>
+    </p:extLst>
+  </p:cSld>
+  <p:clrMapOvr>
+    <a:masterClrMapping/>
+  </p:clrMapOvr>
+</p:notes>
+</file>
+
+<file path=ppt/notesSlides/notesSlide11.xml><?xml version="1.0" encoding="utf-8"?>
+<p:notes xmlns:a="http://schemas.openxmlformats.org/drawingml/2006/main" xmlns:r="http://schemas.openxmlformats.org/officeDocument/2006/relationships" xmlns:p="http://schemas.openxmlformats.org/presentationml/2006/main">
+  <p:cSld>
+    <p:spTree>
+      <p:nvGrpSpPr>
+        <p:cNvPr id="1" name=""/>
+        <p:cNvGrpSpPr/>
+        <p:nvPr/>
+      </p:nvGrpSpPr>
+      <p:grpSpPr>
+        <a:xfrm>
+          <a:off x="0" y="0"/>
+          <a:ext cx="0" cy="0"/>
+          <a:chOff x="0" y="0"/>
+          <a:chExt cx="0" cy="0"/>
+        </a:xfrm>
+      </p:grpSpPr>
+      <p:sp>
+        <p:nvSpPr>
+          <p:cNvPr id="2" name="Tijdelijke aanduiding voor dia-afbeelding 1"/>
+          <p:cNvSpPr>
+            <a:spLocks noGrp="1" noRot="1" noChangeAspect="1"/>
+          </p:cNvSpPr>
+          <p:nvPr>
+            <p:ph type="sldImg"/>
+          </p:nvPr>
+        </p:nvSpPr>
+        <p:spPr/>
+      </p:sp>
+      <p:sp>
+        <p:nvSpPr>
+          <p:cNvPr id="3" name="Tijdelijke aanduiding voor notities 2"/>
+          <p:cNvSpPr>
+            <a:spLocks noGrp="1"/>
+          </p:cNvSpPr>
+          <p:nvPr>
+            <p:ph type="body" idx="1"/>
+          </p:nvPr>
+        </p:nvSpPr>
+        <p:spPr/>
+        <p:txBody>
+          <a:bodyPr rtlCol="0"/>
+          <a:lstStyle/>
+          <a:p>
+            <a:pPr rtl="0"/>
+            <a:endParaRPr lang="nl-NL"/>
+          </a:p>
+        </p:txBody>
+      </p:sp>
+      <p:sp>
+        <p:nvSpPr>
+          <p:cNvPr id="4" name="Tijdelijke aanduiding voor dianummer 3"/>
+          <p:cNvSpPr>
+            <a:spLocks noGrp="1"/>
+          </p:cNvSpPr>
+          <p:nvPr>
+            <p:ph type="sldNum" sz="quarter" idx="5"/>
+          </p:nvPr>
+        </p:nvSpPr>
+        <p:spPr/>
+        <p:txBody>
+          <a:bodyPr rtlCol="0"/>
+          <a:lstStyle/>
+          <a:p>
+            <a:pPr rtl="0"/>
+            <a:fld id="{C6B3AB32-59DF-41F1-9618-EDFBF5049629}" type="slidenum">
+              <a:rPr lang="nl-NL" smtClean="0"/>
+              <a:t>12</a:t>
+            </a:fld>
+            <a:endParaRPr lang="nl-NL"/>
+          </a:p>
+        </p:txBody>
+      </p:sp>
+    </p:spTree>
+    <p:extLst>
+      <p:ext uri="{BB962C8B-B14F-4D97-AF65-F5344CB8AC3E}">
+        <p14:creationId xmlns:p14="http://schemas.microsoft.com/office/powerpoint/2010/main" val="555461825"/>
+      </p:ext>
+    </p:extLst>
+  </p:cSld>
+  <p:clrMapOvr>
+    <a:masterClrMapping/>
+  </p:clrMapOvr>
+</p:notes>
+</file>
+
+<file path=ppt/notesSlides/notesSlide12.xml><?xml version="1.0" encoding="utf-8"?>
+<p:notes xmlns:a="http://schemas.openxmlformats.org/drawingml/2006/main" xmlns:r="http://schemas.openxmlformats.org/officeDocument/2006/relationships" xmlns:p="http://schemas.openxmlformats.org/presentationml/2006/main">
+  <p:cSld>
+    <p:spTree>
+      <p:nvGrpSpPr>
+        <p:cNvPr id="1" name=""/>
+        <p:cNvGrpSpPr/>
+        <p:nvPr/>
+      </p:nvGrpSpPr>
+      <p:grpSpPr>
+        <a:xfrm>
+          <a:off x="0" y="0"/>
+          <a:ext cx="0" cy="0"/>
+          <a:chOff x="0" y="0"/>
+          <a:chExt cx="0" cy="0"/>
+        </a:xfrm>
+      </p:grpSpPr>
+      <p:sp>
+        <p:nvSpPr>
+          <p:cNvPr id="2" name="Tijdelijke aanduiding voor dia-afbeelding 1"/>
+          <p:cNvSpPr>
+            <a:spLocks noGrp="1" noRot="1" noChangeAspect="1"/>
+          </p:cNvSpPr>
+          <p:nvPr>
+            <p:ph type="sldImg"/>
+          </p:nvPr>
+        </p:nvSpPr>
+        <p:spPr/>
+      </p:sp>
+      <p:sp>
+        <p:nvSpPr>
+          <p:cNvPr id="3" name="Tijdelijke aanduiding voor notities 2"/>
+          <p:cNvSpPr>
+            <a:spLocks noGrp="1"/>
+          </p:cNvSpPr>
+          <p:nvPr>
+            <p:ph type="body" idx="1"/>
+          </p:nvPr>
+        </p:nvSpPr>
+        <p:spPr/>
+        <p:txBody>
+          <a:bodyPr rtlCol="0"/>
+          <a:lstStyle/>
+          <a:p>
+            <a:pPr rtl="0"/>
+            <a:endParaRPr lang="nl-NL"/>
+          </a:p>
+        </p:txBody>
+      </p:sp>
+      <p:sp>
+        <p:nvSpPr>
+          <p:cNvPr id="4" name="Tijdelijke aanduiding voor dianummer 3"/>
+          <p:cNvSpPr>
+            <a:spLocks noGrp="1"/>
+          </p:cNvSpPr>
+          <p:nvPr>
+            <p:ph type="sldNum" sz="quarter" idx="5"/>
+          </p:nvPr>
+        </p:nvSpPr>
+        <p:spPr/>
+        <p:txBody>
+          <a:bodyPr rtlCol="0"/>
+          <a:lstStyle/>
+          <a:p>
+            <a:pPr rtl="0"/>
+            <a:fld id="{C6B3AB32-59DF-41F1-9618-EDFBF5049629}" type="slidenum">
+              <a:rPr lang="nl-NL" smtClean="0"/>
+              <a:t>13</a:t>
+            </a:fld>
+            <a:endParaRPr lang="nl-NL"/>
+          </a:p>
+        </p:txBody>
+      </p:sp>
+    </p:spTree>
+    <p:extLst>
+      <p:ext uri="{BB962C8B-B14F-4D97-AF65-F5344CB8AC3E}">
+        <p14:creationId xmlns:p14="http://schemas.microsoft.com/office/powerpoint/2010/main" val="3216733822"/>
+      </p:ext>
+    </p:extLst>
+  </p:cSld>
+  <p:clrMapOvr>
+    <a:masterClrMapping/>
+  </p:clrMapOvr>
+</p:notes>
+</file>
+
+<file path=ppt/notesSlides/notesSlide13.xml><?xml version="1.0" encoding="utf-8"?>
+<p:notes xmlns:a="http://schemas.openxmlformats.org/drawingml/2006/main" xmlns:r="http://schemas.openxmlformats.org/officeDocument/2006/relationships" xmlns:p="http://schemas.openxmlformats.org/presentationml/2006/main">
+  <p:cSld>
+    <p:spTree>
+      <p:nvGrpSpPr>
+        <p:cNvPr id="1" name=""/>
+        <p:cNvGrpSpPr/>
+        <p:nvPr/>
+      </p:nvGrpSpPr>
+      <p:grpSpPr>
+        <a:xfrm>
+          <a:off x="0" y="0"/>
+          <a:ext cx="0" cy="0"/>
+          <a:chOff x="0" y="0"/>
+          <a:chExt cx="0" cy="0"/>
+        </a:xfrm>
+      </p:grpSpPr>
+      <p:sp>
+        <p:nvSpPr>
+          <p:cNvPr id="2" name="Tijdelijke aanduiding voor dia-afbeelding 1"/>
+          <p:cNvSpPr>
+            <a:spLocks noGrp="1" noRot="1" noChangeAspect="1"/>
+          </p:cNvSpPr>
+          <p:nvPr>
+            <p:ph type="sldImg"/>
+          </p:nvPr>
+        </p:nvSpPr>
+        <p:spPr/>
+      </p:sp>
+      <p:sp>
+        <p:nvSpPr>
+          <p:cNvPr id="3" name="Tijdelijke aanduiding voor notities 2"/>
+          <p:cNvSpPr>
+            <a:spLocks noGrp="1"/>
+          </p:cNvSpPr>
+          <p:nvPr>
+            <p:ph type="body" idx="1"/>
+          </p:nvPr>
+        </p:nvSpPr>
+        <p:spPr/>
+        <p:txBody>
+          <a:bodyPr rtlCol="0"/>
+          <a:lstStyle/>
+          <a:p>
+            <a:pPr rtl="0"/>
+            <a:endParaRPr lang="nl-NL"/>
+          </a:p>
+        </p:txBody>
+      </p:sp>
+      <p:sp>
+        <p:nvSpPr>
+          <p:cNvPr id="4" name="Tijdelijke aanduiding voor dianummer 3"/>
+          <p:cNvSpPr>
+            <a:spLocks noGrp="1"/>
+          </p:cNvSpPr>
+          <p:nvPr>
+            <p:ph type="sldNum" sz="quarter" idx="5"/>
+          </p:nvPr>
+        </p:nvSpPr>
+        <p:spPr/>
+        <p:txBody>
+          <a:bodyPr rtlCol="0"/>
+          <a:lstStyle/>
+          <a:p>
+            <a:pPr rtl="0"/>
+            <a:fld id="{C6B3AB32-59DF-41F1-9618-EDFBF5049629}" type="slidenum">
+              <a:rPr lang="nl-NL" smtClean="0"/>
+              <a:t>14</a:t>
+            </a:fld>
+            <a:endParaRPr lang="nl-NL"/>
+          </a:p>
+        </p:txBody>
+      </p:sp>
+    </p:spTree>
+    <p:extLst>
+      <p:ext uri="{BB962C8B-B14F-4D97-AF65-F5344CB8AC3E}">
+        <p14:creationId xmlns:p14="http://schemas.microsoft.com/office/powerpoint/2010/main" val="3875420689"/>
+      </p:ext>
+    </p:extLst>
+  </p:cSld>
+  <p:clrMapOvr>
+    <a:masterClrMapping/>
+  </p:clrMapOvr>
+</p:notes>
+</file>
+
 <file path=ppt/notesSlides/notesSlide2.xml><?xml version="1.0" encoding="utf-8"?>
 <p:notes xmlns:a="http://schemas.openxmlformats.org/drawingml/2006/main" xmlns:r="http://schemas.openxmlformats.org/officeDocument/2006/relationships" xmlns:p="http://schemas.openxmlformats.org/presentationml/2006/main">
   <p:cSld>
@@ -937,6 +1285,522 @@
 </p:notes>
 </file>
 
+<file path=ppt/notesSlides/notesSlide4.xml><?xml version="1.0" encoding="utf-8"?>
+<p:notes xmlns:a="http://schemas.openxmlformats.org/drawingml/2006/main" xmlns:r="http://schemas.openxmlformats.org/officeDocument/2006/relationships" xmlns:p="http://schemas.openxmlformats.org/presentationml/2006/main">
+  <p:cSld>
+    <p:spTree>
+      <p:nvGrpSpPr>
+        <p:cNvPr id="1" name=""/>
+        <p:cNvGrpSpPr/>
+        <p:nvPr/>
+      </p:nvGrpSpPr>
+      <p:grpSpPr>
+        <a:xfrm>
+          <a:off x="0" y="0"/>
+          <a:ext cx="0" cy="0"/>
+          <a:chOff x="0" y="0"/>
+          <a:chExt cx="0" cy="0"/>
+        </a:xfrm>
+      </p:grpSpPr>
+      <p:sp>
+        <p:nvSpPr>
+          <p:cNvPr id="2" name="Tijdelijke aanduiding voor dia-afbeelding 1"/>
+          <p:cNvSpPr>
+            <a:spLocks noGrp="1" noRot="1" noChangeAspect="1"/>
+          </p:cNvSpPr>
+          <p:nvPr>
+            <p:ph type="sldImg"/>
+          </p:nvPr>
+        </p:nvSpPr>
+        <p:spPr/>
+      </p:sp>
+      <p:sp>
+        <p:nvSpPr>
+          <p:cNvPr id="3" name="Tijdelijke aanduiding voor notities 2"/>
+          <p:cNvSpPr>
+            <a:spLocks noGrp="1"/>
+          </p:cNvSpPr>
+          <p:nvPr>
+            <p:ph type="body" idx="1"/>
+          </p:nvPr>
+        </p:nvSpPr>
+        <p:spPr/>
+        <p:txBody>
+          <a:bodyPr rtlCol="0"/>
+          <a:lstStyle/>
+          <a:p>
+            <a:pPr rtl="0"/>
+            <a:endParaRPr lang="nl-NL"/>
+          </a:p>
+        </p:txBody>
+      </p:sp>
+      <p:sp>
+        <p:nvSpPr>
+          <p:cNvPr id="4" name="Tijdelijke aanduiding voor dianummer 3"/>
+          <p:cNvSpPr>
+            <a:spLocks noGrp="1"/>
+          </p:cNvSpPr>
+          <p:nvPr>
+            <p:ph type="sldNum" sz="quarter" idx="5"/>
+          </p:nvPr>
+        </p:nvSpPr>
+        <p:spPr/>
+        <p:txBody>
+          <a:bodyPr rtlCol="0"/>
+          <a:lstStyle/>
+          <a:p>
+            <a:pPr rtl="0"/>
+            <a:fld id="{C6B3AB32-59DF-41F1-9618-EDFBF5049629}" type="slidenum">
+              <a:rPr lang="nl-NL" smtClean="0"/>
+              <a:t>5</a:t>
+            </a:fld>
+            <a:endParaRPr lang="nl-NL"/>
+          </a:p>
+        </p:txBody>
+      </p:sp>
+    </p:spTree>
+    <p:extLst>
+      <p:ext uri="{BB962C8B-B14F-4D97-AF65-F5344CB8AC3E}">
+        <p14:creationId xmlns:p14="http://schemas.microsoft.com/office/powerpoint/2010/main" val="893153359"/>
+      </p:ext>
+    </p:extLst>
+  </p:cSld>
+  <p:clrMapOvr>
+    <a:masterClrMapping/>
+  </p:clrMapOvr>
+</p:notes>
+</file>
+
+<file path=ppt/notesSlides/notesSlide5.xml><?xml version="1.0" encoding="utf-8"?>
+<p:notes xmlns:a="http://schemas.openxmlformats.org/drawingml/2006/main" xmlns:r="http://schemas.openxmlformats.org/officeDocument/2006/relationships" xmlns:p="http://schemas.openxmlformats.org/presentationml/2006/main">
+  <p:cSld>
+    <p:spTree>
+      <p:nvGrpSpPr>
+        <p:cNvPr id="1" name=""/>
+        <p:cNvGrpSpPr/>
+        <p:nvPr/>
+      </p:nvGrpSpPr>
+      <p:grpSpPr>
+        <a:xfrm>
+          <a:off x="0" y="0"/>
+          <a:ext cx="0" cy="0"/>
+          <a:chOff x="0" y="0"/>
+          <a:chExt cx="0" cy="0"/>
+        </a:xfrm>
+      </p:grpSpPr>
+      <p:sp>
+        <p:nvSpPr>
+          <p:cNvPr id="2" name="Tijdelijke aanduiding voor dia-afbeelding 1"/>
+          <p:cNvSpPr>
+            <a:spLocks noGrp="1" noRot="1" noChangeAspect="1"/>
+          </p:cNvSpPr>
+          <p:nvPr>
+            <p:ph type="sldImg"/>
+          </p:nvPr>
+        </p:nvSpPr>
+        <p:spPr/>
+      </p:sp>
+      <p:sp>
+        <p:nvSpPr>
+          <p:cNvPr id="3" name="Tijdelijke aanduiding voor notities 2"/>
+          <p:cNvSpPr>
+            <a:spLocks noGrp="1"/>
+          </p:cNvSpPr>
+          <p:nvPr>
+            <p:ph type="body" idx="1"/>
+          </p:nvPr>
+        </p:nvSpPr>
+        <p:spPr/>
+        <p:txBody>
+          <a:bodyPr rtlCol="0"/>
+          <a:lstStyle/>
+          <a:p>
+            <a:pPr rtl="0"/>
+            <a:endParaRPr lang="nl-NL"/>
+          </a:p>
+        </p:txBody>
+      </p:sp>
+      <p:sp>
+        <p:nvSpPr>
+          <p:cNvPr id="4" name="Tijdelijke aanduiding voor dianummer 3"/>
+          <p:cNvSpPr>
+            <a:spLocks noGrp="1"/>
+          </p:cNvSpPr>
+          <p:nvPr>
+            <p:ph type="sldNum" sz="quarter" idx="5"/>
+          </p:nvPr>
+        </p:nvSpPr>
+        <p:spPr/>
+        <p:txBody>
+          <a:bodyPr rtlCol="0"/>
+          <a:lstStyle/>
+          <a:p>
+            <a:pPr rtl="0"/>
+            <a:fld id="{C6B3AB32-59DF-41F1-9618-EDFBF5049629}" type="slidenum">
+              <a:rPr lang="nl-NL" smtClean="0"/>
+              <a:t>6</a:t>
+            </a:fld>
+            <a:endParaRPr lang="nl-NL"/>
+          </a:p>
+        </p:txBody>
+      </p:sp>
+    </p:spTree>
+    <p:extLst>
+      <p:ext uri="{BB962C8B-B14F-4D97-AF65-F5344CB8AC3E}">
+        <p14:creationId xmlns:p14="http://schemas.microsoft.com/office/powerpoint/2010/main" val="2145369781"/>
+      </p:ext>
+    </p:extLst>
+  </p:cSld>
+  <p:clrMapOvr>
+    <a:masterClrMapping/>
+  </p:clrMapOvr>
+</p:notes>
+</file>
+
+<file path=ppt/notesSlides/notesSlide6.xml><?xml version="1.0" encoding="utf-8"?>
+<p:notes xmlns:a="http://schemas.openxmlformats.org/drawingml/2006/main" xmlns:r="http://schemas.openxmlformats.org/officeDocument/2006/relationships" xmlns:p="http://schemas.openxmlformats.org/presentationml/2006/main">
+  <p:cSld>
+    <p:spTree>
+      <p:nvGrpSpPr>
+        <p:cNvPr id="1" name=""/>
+        <p:cNvGrpSpPr/>
+        <p:nvPr/>
+      </p:nvGrpSpPr>
+      <p:grpSpPr>
+        <a:xfrm>
+          <a:off x="0" y="0"/>
+          <a:ext cx="0" cy="0"/>
+          <a:chOff x="0" y="0"/>
+          <a:chExt cx="0" cy="0"/>
+        </a:xfrm>
+      </p:grpSpPr>
+      <p:sp>
+        <p:nvSpPr>
+          <p:cNvPr id="2" name="Tijdelijke aanduiding voor dia-afbeelding 1"/>
+          <p:cNvSpPr>
+            <a:spLocks noGrp="1" noRot="1" noChangeAspect="1"/>
+          </p:cNvSpPr>
+          <p:nvPr>
+            <p:ph type="sldImg"/>
+          </p:nvPr>
+        </p:nvSpPr>
+        <p:spPr/>
+      </p:sp>
+      <p:sp>
+        <p:nvSpPr>
+          <p:cNvPr id="3" name="Tijdelijke aanduiding voor notities 2"/>
+          <p:cNvSpPr>
+            <a:spLocks noGrp="1"/>
+          </p:cNvSpPr>
+          <p:nvPr>
+            <p:ph type="body" idx="1"/>
+          </p:nvPr>
+        </p:nvSpPr>
+        <p:spPr/>
+        <p:txBody>
+          <a:bodyPr rtlCol="0"/>
+          <a:lstStyle/>
+          <a:p>
+            <a:pPr rtl="0"/>
+            <a:endParaRPr lang="nl-NL"/>
+          </a:p>
+        </p:txBody>
+      </p:sp>
+      <p:sp>
+        <p:nvSpPr>
+          <p:cNvPr id="4" name="Tijdelijke aanduiding voor dianummer 3"/>
+          <p:cNvSpPr>
+            <a:spLocks noGrp="1"/>
+          </p:cNvSpPr>
+          <p:nvPr>
+            <p:ph type="sldNum" sz="quarter" idx="5"/>
+          </p:nvPr>
+        </p:nvSpPr>
+        <p:spPr/>
+        <p:txBody>
+          <a:bodyPr rtlCol="0"/>
+          <a:lstStyle/>
+          <a:p>
+            <a:pPr rtl="0"/>
+            <a:fld id="{C6B3AB32-59DF-41F1-9618-EDFBF5049629}" type="slidenum">
+              <a:rPr lang="nl-NL" smtClean="0"/>
+              <a:t>7</a:t>
+            </a:fld>
+            <a:endParaRPr lang="nl-NL"/>
+          </a:p>
+        </p:txBody>
+      </p:sp>
+    </p:spTree>
+    <p:extLst>
+      <p:ext uri="{BB962C8B-B14F-4D97-AF65-F5344CB8AC3E}">
+        <p14:creationId xmlns:p14="http://schemas.microsoft.com/office/powerpoint/2010/main" val="707642453"/>
+      </p:ext>
+    </p:extLst>
+  </p:cSld>
+  <p:clrMapOvr>
+    <a:masterClrMapping/>
+  </p:clrMapOvr>
+</p:notes>
+</file>
+
+<file path=ppt/notesSlides/notesSlide7.xml><?xml version="1.0" encoding="utf-8"?>
+<p:notes xmlns:a="http://schemas.openxmlformats.org/drawingml/2006/main" xmlns:r="http://schemas.openxmlformats.org/officeDocument/2006/relationships" xmlns:p="http://schemas.openxmlformats.org/presentationml/2006/main">
+  <p:cSld>
+    <p:spTree>
+      <p:nvGrpSpPr>
+        <p:cNvPr id="1" name=""/>
+        <p:cNvGrpSpPr/>
+        <p:nvPr/>
+      </p:nvGrpSpPr>
+      <p:grpSpPr>
+        <a:xfrm>
+          <a:off x="0" y="0"/>
+          <a:ext cx="0" cy="0"/>
+          <a:chOff x="0" y="0"/>
+          <a:chExt cx="0" cy="0"/>
+        </a:xfrm>
+      </p:grpSpPr>
+      <p:sp>
+        <p:nvSpPr>
+          <p:cNvPr id="2" name="Tijdelijke aanduiding voor dia-afbeelding 1"/>
+          <p:cNvSpPr>
+            <a:spLocks noGrp="1" noRot="1" noChangeAspect="1"/>
+          </p:cNvSpPr>
+          <p:nvPr>
+            <p:ph type="sldImg"/>
+          </p:nvPr>
+        </p:nvSpPr>
+        <p:spPr/>
+      </p:sp>
+      <p:sp>
+        <p:nvSpPr>
+          <p:cNvPr id="3" name="Tijdelijke aanduiding voor notities 2"/>
+          <p:cNvSpPr>
+            <a:spLocks noGrp="1"/>
+          </p:cNvSpPr>
+          <p:nvPr>
+            <p:ph type="body" idx="1"/>
+          </p:nvPr>
+        </p:nvSpPr>
+        <p:spPr/>
+        <p:txBody>
+          <a:bodyPr rtlCol="0"/>
+          <a:lstStyle/>
+          <a:p>
+            <a:pPr rtl="0"/>
+            <a:endParaRPr lang="nl-NL"/>
+          </a:p>
+        </p:txBody>
+      </p:sp>
+      <p:sp>
+        <p:nvSpPr>
+          <p:cNvPr id="4" name="Tijdelijke aanduiding voor dianummer 3"/>
+          <p:cNvSpPr>
+            <a:spLocks noGrp="1"/>
+          </p:cNvSpPr>
+          <p:nvPr>
+            <p:ph type="sldNum" sz="quarter" idx="5"/>
+          </p:nvPr>
+        </p:nvSpPr>
+        <p:spPr/>
+        <p:txBody>
+          <a:bodyPr rtlCol="0"/>
+          <a:lstStyle/>
+          <a:p>
+            <a:pPr rtl="0"/>
+            <a:fld id="{C6B3AB32-59DF-41F1-9618-EDFBF5049629}" type="slidenum">
+              <a:rPr lang="nl-NL" smtClean="0"/>
+              <a:t>8</a:t>
+            </a:fld>
+            <a:endParaRPr lang="nl-NL"/>
+          </a:p>
+        </p:txBody>
+      </p:sp>
+    </p:spTree>
+    <p:extLst>
+      <p:ext uri="{BB962C8B-B14F-4D97-AF65-F5344CB8AC3E}">
+        <p14:creationId xmlns:p14="http://schemas.microsoft.com/office/powerpoint/2010/main" val="3486042036"/>
+      </p:ext>
+    </p:extLst>
+  </p:cSld>
+  <p:clrMapOvr>
+    <a:masterClrMapping/>
+  </p:clrMapOvr>
+</p:notes>
+</file>
+
+<file path=ppt/notesSlides/notesSlide8.xml><?xml version="1.0" encoding="utf-8"?>
+<p:notes xmlns:a="http://schemas.openxmlformats.org/drawingml/2006/main" xmlns:r="http://schemas.openxmlformats.org/officeDocument/2006/relationships" xmlns:p="http://schemas.openxmlformats.org/presentationml/2006/main">
+  <p:cSld>
+    <p:spTree>
+      <p:nvGrpSpPr>
+        <p:cNvPr id="1" name=""/>
+        <p:cNvGrpSpPr/>
+        <p:nvPr/>
+      </p:nvGrpSpPr>
+      <p:grpSpPr>
+        <a:xfrm>
+          <a:off x="0" y="0"/>
+          <a:ext cx="0" cy="0"/>
+          <a:chOff x="0" y="0"/>
+          <a:chExt cx="0" cy="0"/>
+        </a:xfrm>
+      </p:grpSpPr>
+      <p:sp>
+        <p:nvSpPr>
+          <p:cNvPr id="2" name="Tijdelijke aanduiding voor dia-afbeelding 1"/>
+          <p:cNvSpPr>
+            <a:spLocks noGrp="1" noRot="1" noChangeAspect="1"/>
+          </p:cNvSpPr>
+          <p:nvPr>
+            <p:ph type="sldImg"/>
+          </p:nvPr>
+        </p:nvSpPr>
+        <p:spPr/>
+      </p:sp>
+      <p:sp>
+        <p:nvSpPr>
+          <p:cNvPr id="3" name="Tijdelijke aanduiding voor notities 2"/>
+          <p:cNvSpPr>
+            <a:spLocks noGrp="1"/>
+          </p:cNvSpPr>
+          <p:nvPr>
+            <p:ph type="body" idx="1"/>
+          </p:nvPr>
+        </p:nvSpPr>
+        <p:spPr/>
+        <p:txBody>
+          <a:bodyPr rtlCol="0"/>
+          <a:lstStyle/>
+          <a:p>
+            <a:pPr rtl="0"/>
+            <a:endParaRPr lang="nl-NL"/>
+          </a:p>
+        </p:txBody>
+      </p:sp>
+      <p:sp>
+        <p:nvSpPr>
+          <p:cNvPr id="4" name="Tijdelijke aanduiding voor dianummer 3"/>
+          <p:cNvSpPr>
+            <a:spLocks noGrp="1"/>
+          </p:cNvSpPr>
+          <p:nvPr>
+            <p:ph type="sldNum" sz="quarter" idx="5"/>
+          </p:nvPr>
+        </p:nvSpPr>
+        <p:spPr/>
+        <p:txBody>
+          <a:bodyPr rtlCol="0"/>
+          <a:lstStyle/>
+          <a:p>
+            <a:pPr rtl="0"/>
+            <a:fld id="{C6B3AB32-59DF-41F1-9618-EDFBF5049629}" type="slidenum">
+              <a:rPr lang="nl-NL" smtClean="0"/>
+              <a:t>9</a:t>
+            </a:fld>
+            <a:endParaRPr lang="nl-NL"/>
+          </a:p>
+        </p:txBody>
+      </p:sp>
+    </p:spTree>
+    <p:extLst>
+      <p:ext uri="{BB962C8B-B14F-4D97-AF65-F5344CB8AC3E}">
+        <p14:creationId xmlns:p14="http://schemas.microsoft.com/office/powerpoint/2010/main" val="523488510"/>
+      </p:ext>
+    </p:extLst>
+  </p:cSld>
+  <p:clrMapOvr>
+    <a:masterClrMapping/>
+  </p:clrMapOvr>
+</p:notes>
+</file>
+
+<file path=ppt/notesSlides/notesSlide9.xml><?xml version="1.0" encoding="utf-8"?>
+<p:notes xmlns:a="http://schemas.openxmlformats.org/drawingml/2006/main" xmlns:r="http://schemas.openxmlformats.org/officeDocument/2006/relationships" xmlns:p="http://schemas.openxmlformats.org/presentationml/2006/main">
+  <p:cSld>
+    <p:spTree>
+      <p:nvGrpSpPr>
+        <p:cNvPr id="1" name=""/>
+        <p:cNvGrpSpPr/>
+        <p:nvPr/>
+      </p:nvGrpSpPr>
+      <p:grpSpPr>
+        <a:xfrm>
+          <a:off x="0" y="0"/>
+          <a:ext cx="0" cy="0"/>
+          <a:chOff x="0" y="0"/>
+          <a:chExt cx="0" cy="0"/>
+        </a:xfrm>
+      </p:grpSpPr>
+      <p:sp>
+        <p:nvSpPr>
+          <p:cNvPr id="2" name="Tijdelijke aanduiding voor dia-afbeelding 1"/>
+          <p:cNvSpPr>
+            <a:spLocks noGrp="1" noRot="1" noChangeAspect="1"/>
+          </p:cNvSpPr>
+          <p:nvPr>
+            <p:ph type="sldImg"/>
+          </p:nvPr>
+        </p:nvSpPr>
+        <p:spPr/>
+      </p:sp>
+      <p:sp>
+        <p:nvSpPr>
+          <p:cNvPr id="3" name="Tijdelijke aanduiding voor notities 2"/>
+          <p:cNvSpPr>
+            <a:spLocks noGrp="1"/>
+          </p:cNvSpPr>
+          <p:nvPr>
+            <p:ph type="body" idx="1"/>
+          </p:nvPr>
+        </p:nvSpPr>
+        <p:spPr/>
+        <p:txBody>
+          <a:bodyPr rtlCol="0"/>
+          <a:lstStyle/>
+          <a:p>
+            <a:pPr rtl="0"/>
+            <a:endParaRPr lang="nl-NL"/>
+          </a:p>
+        </p:txBody>
+      </p:sp>
+      <p:sp>
+        <p:nvSpPr>
+          <p:cNvPr id="4" name="Tijdelijke aanduiding voor dianummer 3"/>
+          <p:cNvSpPr>
+            <a:spLocks noGrp="1"/>
+          </p:cNvSpPr>
+          <p:nvPr>
+            <p:ph type="sldNum" sz="quarter" idx="5"/>
+          </p:nvPr>
+        </p:nvSpPr>
+        <p:spPr/>
+        <p:txBody>
+          <a:bodyPr rtlCol="0"/>
+          <a:lstStyle/>
+          <a:p>
+            <a:pPr rtl="0"/>
+            <a:fld id="{C6B3AB32-59DF-41F1-9618-EDFBF5049629}" type="slidenum">
+              <a:rPr lang="nl-NL" smtClean="0"/>
+              <a:t>10</a:t>
+            </a:fld>
+            <a:endParaRPr lang="nl-NL"/>
+          </a:p>
+        </p:txBody>
+      </p:sp>
+    </p:spTree>
+    <p:extLst>
+      <p:ext uri="{BB962C8B-B14F-4D97-AF65-F5344CB8AC3E}">
+        <p14:creationId xmlns:p14="http://schemas.microsoft.com/office/powerpoint/2010/main" val="3121753945"/>
+      </p:ext>
+    </p:extLst>
+  </p:cSld>
+  <p:clrMapOvr>
+    <a:masterClrMapping/>
+  </p:clrMapOvr>
+</p:notes>
+</file>
+
 <file path=ppt/slideLayouts/slideLayout1.xml><?xml version="1.0" encoding="utf-8"?>
 <p:sldLayout xmlns:a="http://schemas.openxmlformats.org/drawingml/2006/main" xmlns:r="http://schemas.openxmlformats.org/officeDocument/2006/relationships" xmlns:p="http://schemas.openxmlformats.org/presentationml/2006/main" type="title" preserve="1">
   <p:cSld name="Titeldia">
@@ -1183,7 +2047,7 @@
             <a:pPr rtl="0"/>
             <a:fld id="{85987116-4901-4649-9594-EB5BB5B891FF}" type="datetime1">
               <a:rPr lang="nl-NL" noProof="0" smtClean="0"/>
-              <a:t>13-3-2025</a:t>
+              <a:t>20-3-2025</a:t>
             </a:fld>
             <a:endParaRPr lang="nl-NL" noProof="0"/>
           </a:p>
@@ -1448,7 +2312,7 @@
             <a:pPr rtl="0"/>
             <a:fld id="{A514DF9E-4CDC-43FA-9E45-80ADD6219AE2}" type="datetime1">
               <a:rPr lang="nl-NL" noProof="0" smtClean="0"/>
-              <a:t>13-3-2025</a:t>
+              <a:t>20-3-2025</a:t>
             </a:fld>
             <a:endParaRPr lang="nl-NL" noProof="0"/>
           </a:p>
@@ -1686,7 +2550,7 @@
             <a:pPr rtl="0"/>
             <a:fld id="{8A83F3FB-33AA-4FC5-8E07-D3459C94B810}" type="datetime1">
               <a:rPr lang="nl-NL" noProof="0" smtClean="0"/>
-              <a:t>13-3-2025</a:t>
+              <a:t>20-3-2025</a:t>
             </a:fld>
             <a:endParaRPr lang="nl-NL" noProof="0"/>
           </a:p>
@@ -1929,7 +2793,7 @@
             <a:pPr rtl="0"/>
             <a:fld id="{BB98C30F-0793-45F7-9D88-900024FC115E}" type="datetime1">
               <a:rPr lang="nl-NL" noProof="0" smtClean="0"/>
-              <a:t>13-3-2025</a:t>
+              <a:t>20-3-2025</a:t>
             </a:fld>
             <a:endParaRPr lang="nl-NL" noProof="0"/>
           </a:p>
@@ -2240,7 +3104,7 @@
             <a:pPr rtl="0"/>
             <a:fld id="{865C4826-BE1E-461D-99D2-2BA6332DA850}" type="datetime1">
               <a:rPr lang="nl-NL" noProof="0" smtClean="0"/>
-              <a:t>13-3-2025</a:t>
+              <a:t>20-3-2025</a:t>
             </a:fld>
             <a:endParaRPr lang="nl-NL" noProof="0"/>
           </a:p>
@@ -2544,7 +3408,7 @@
             <a:pPr rtl="0"/>
             <a:fld id="{13C95475-4C0D-4899-B2C1-19355512A25B}" type="datetime1">
               <a:rPr lang="nl-NL" noProof="0" smtClean="0"/>
-              <a:t>13-3-2025</a:t>
+              <a:t>20-3-2025</a:t>
             </a:fld>
             <a:endParaRPr lang="nl-NL" noProof="0"/>
           </a:p>
@@ -2968,7 +3832,7 @@
             <a:pPr rtl="0"/>
             <a:fld id="{D724E60D-6E2F-4B76-B9BE-7C0DA6060AC3}" type="datetime1">
               <a:rPr lang="nl-NL" noProof="0" smtClean="0"/>
-              <a:t>13-3-2025</a:t>
+              <a:t>20-3-2025</a:t>
             </a:fld>
             <a:endParaRPr lang="nl-NL" noProof="0"/>
           </a:p>
@@ -3067,7 +3931,7 @@
             <a:pPr rtl="0"/>
             <a:fld id="{A9E451B9-61F0-4F77-B94D-B1A2EE9E8DE1}" type="datetime1">
               <a:rPr lang="nl-NL" noProof="0" smtClean="0"/>
-              <a:t>13-3-2025</a:t>
+              <a:t>20-3-2025</a:t>
             </a:fld>
             <a:endParaRPr lang="nl-NL" noProof="0"/>
           </a:p>
@@ -3233,7 +4097,7 @@
             <a:pPr rtl="0"/>
             <a:fld id="{51D06FDC-A8B7-40A6-A4E8-02FDE5D699CA}" type="datetime1">
               <a:rPr lang="nl-NL" noProof="0" smtClean="0"/>
-              <a:t>13-3-2025</a:t>
+              <a:t>20-3-2025</a:t>
             </a:fld>
             <a:endParaRPr lang="nl-NL" noProof="0"/>
           </a:p>
@@ -3614,7 +4478,7 @@
             <a:pPr rtl="0"/>
             <a:fld id="{8E3FC4FD-21F9-4A72-B14F-D07152C9B9DA}" type="datetime1">
               <a:rPr lang="nl-NL" noProof="0" smtClean="0"/>
-              <a:t>13-3-2025</a:t>
+              <a:t>20-3-2025</a:t>
             </a:fld>
             <a:endParaRPr lang="nl-NL" noProof="0"/>
           </a:p>
@@ -3907,7 +4771,7 @@
             <a:pPr rtl="0"/>
             <a:fld id="{2B738FFE-BC55-4B56-87E2-2C977879A0D2}" type="datetime1">
               <a:rPr lang="nl-NL" noProof="0" smtClean="0"/>
-              <a:t>13-3-2025</a:t>
+              <a:t>20-3-2025</a:t>
             </a:fld>
             <a:endParaRPr lang="nl-NL" noProof="0"/>
           </a:p>
@@ -4121,7 +4985,7 @@
             <a:pPr rtl="0"/>
             <a:fld id="{FC457B1E-AEFB-487E-A00C-BD3B08F41CB1}" type="datetime1">
               <a:rPr lang="nl-NL" noProof="0" smtClean="0"/>
-              <a:t>13-3-2025</a:t>
+              <a:t>20-3-2025</a:t>
             </a:fld>
             <a:endParaRPr lang="nl-NL" noProof="0"/>
           </a:p>
@@ -5131,7 +5995,7 @@
           <a:p>
             <a:pPr rtl="0"/>
             <a:r>
-              <a:rPr lang="en-GB" sz="6000" dirty="0">
+              <a:rPr lang="en-GB" sz="6000">
                 <a:solidFill>
                   <a:schemeClr val="bg1"/>
                 </a:solidFill>
@@ -5139,13 +6003,18 @@
               <a:t>P</a:t>
             </a:r>
             <a:r>
-              <a:rPr lang="nl-NL" sz="6000" dirty="0">
+              <a:rPr lang="nl-NL" sz="6000">
                 <a:solidFill>
                   <a:schemeClr val="bg1"/>
                 </a:solidFill>
               </a:rPr>
               <a:t>O meet 2</a:t>
             </a:r>
+            <a:endParaRPr lang="nl-NL" sz="6000" dirty="0">
+              <a:solidFill>
+                <a:schemeClr val="bg1"/>
+              </a:solidFill>
+            </a:endParaRPr>
           </a:p>
         </p:txBody>
       </p:sp>
@@ -5179,7 +6048,7 @@
           <a:p>
             <a:pPr rtl="0"/>
             <a:r>
-              <a:rPr lang="en-GB" dirty="0">
+              <a:rPr lang="en-GB">
                 <a:solidFill>
                   <a:srgbClr val="7CEBFF"/>
                 </a:solidFill>
@@ -5232,7 +6101,7 @@
           <p:cNvPr id="2" name="Titel 1">
             <a:extLst>
               <a:ext uri="{FF2B5EF4-FFF2-40B4-BE49-F238E27FC236}">
-                <a16:creationId xmlns:a16="http://schemas.microsoft.com/office/drawing/2014/main" id="{2CC4F580-2F25-2C94-C165-16D309F51CF1}"/>
+                <a16:creationId xmlns:a16="http://schemas.microsoft.com/office/drawing/2014/main" id="{C02C5318-1A1E-49D0-B2E2-A4B0FA9E8A40}"/>
               </a:ext>
             </a:extLst>
           </p:cNvPr>
@@ -5243,29 +6112,32 @@
             <p:ph type="title"/>
           </p:nvPr>
         </p:nvSpPr>
-        <p:spPr/>
-        <p:txBody>
-          <a:bodyPr/>
+        <p:spPr>
+          <a:xfrm>
+            <a:off x="581193" y="729658"/>
+            <a:ext cx="11029616" cy="988332"/>
+          </a:xfrm>
+        </p:spPr>
+        <p:txBody>
+          <a:bodyPr rtlCol="0" anchor="b">
+            <a:normAutofit/>
+          </a:bodyPr>
           <a:lstStyle/>
           <a:p>
-            <a:r>
-              <a:rPr lang="en-GB" dirty="0" err="1"/>
-              <a:t>Knoppen</a:t>
-            </a:r>
-            <a:r>
-              <a:rPr lang="en-GB" dirty="0"/>
-              <a:t> design</a:t>
-            </a:r>
-            <a:endParaRPr lang="nl-NL" dirty="0"/>
-          </a:p>
-        </p:txBody>
-      </p:sp>
-      <p:sp>
-        <p:nvSpPr>
-          <p:cNvPr id="3" name="Tijdelijke aanduiding voor inhoud 2">
+            <a:pPr rtl="0"/>
+            <a:r>
+              <a:rPr lang="nl-NL" dirty="0"/>
+              <a:t>Prototype biljet uitwerper</a:t>
+            </a:r>
+          </a:p>
+        </p:txBody>
+      </p:sp>
+      <p:sp>
+        <p:nvSpPr>
+          <p:cNvPr id="3" name="Subtitel 2">
             <a:extLst>
               <a:ext uri="{FF2B5EF4-FFF2-40B4-BE49-F238E27FC236}">
-                <a16:creationId xmlns:a16="http://schemas.microsoft.com/office/drawing/2014/main" id="{6D0E503A-A9BB-61AD-C3EB-69399EE5035B}"/>
+                <a16:creationId xmlns:a16="http://schemas.microsoft.com/office/drawing/2014/main" id="{48B6CF59-4E5B-494D-A2F7-97ADD01E6497}"/>
               </a:ext>
             </a:extLst>
           </p:cNvPr>
@@ -5273,22 +6145,900 @@
             <a:spLocks noGrp="1"/>
           </p:cNvSpPr>
           <p:nvPr>
-            <p:ph idx="1"/>
-          </p:nvPr>
-        </p:nvSpPr>
-        <p:spPr/>
-        <p:txBody>
-          <a:bodyPr/>
+            <p:ph sz="half" idx="1"/>
+          </p:nvPr>
+        </p:nvSpPr>
+        <p:spPr>
+          <a:xfrm>
+            <a:off x="581193" y="2228003"/>
+            <a:ext cx="5422390" cy="3633047"/>
+          </a:xfrm>
+        </p:spPr>
+        <p:txBody>
+          <a:bodyPr rtlCol="0" anchor="ctr">
+            <a:normAutofit/>
+          </a:bodyPr>
           <a:lstStyle/>
           <a:p>
-            <a:endParaRPr lang="nl-NL"/>
-          </a:p>
-        </p:txBody>
-      </p:sp>
+            <a:pPr marL="0" indent="0" rtl="0">
+              <a:buNone/>
+            </a:pPr>
+            <a:r>
+              <a:rPr lang="nl-NL" dirty="0"/>
+              <a:t>US 13:</a:t>
+            </a:r>
+          </a:p>
+          <a:p>
+            <a:pPr marL="0" indent="0" rtl="0">
+              <a:buNone/>
+            </a:pPr>
+            <a:r>
+              <a:rPr lang="nl-NL" sz="1800" dirty="0">
+                <a:effectLst/>
+                <a:latin typeface="Aptos" panose="020B0004020202020204" pitchFamily="34" charset="0"/>
+                <a:ea typeface="Aptos" panose="020B0004020202020204" pitchFamily="34" charset="0"/>
+                <a:cs typeface="Arial" panose="020B0604020202020204" pitchFamily="34" charset="0"/>
+              </a:rPr>
+              <a:t>Als gebruiker wil ik graag verschillende biljetten kunnen pinnen.</a:t>
+            </a:r>
+          </a:p>
+          <a:p>
+            <a:pPr marL="0" indent="0" rtl="0">
+              <a:buNone/>
+            </a:pPr>
+            <a:r>
+              <a:rPr lang="nl-NL" dirty="0">
+                <a:latin typeface="Aptos" panose="020B0004020202020204" pitchFamily="34" charset="0"/>
+                <a:cs typeface="Arial" panose="020B0604020202020204" pitchFamily="34" charset="0"/>
+              </a:rPr>
+              <a:t>Taak:</a:t>
+            </a:r>
+          </a:p>
+          <a:p>
+            <a:pPr marL="0" indent="0" rtl="0">
+              <a:buNone/>
+            </a:pPr>
+            <a:r>
+              <a:rPr lang="nl-NL" sz="1800" dirty="0">
+                <a:effectLst/>
+                <a:latin typeface="Aptos" panose="020B0004020202020204" pitchFamily="34" charset="0"/>
+                <a:ea typeface="Aptos" panose="020B0004020202020204" pitchFamily="34" charset="0"/>
+                <a:cs typeface="Arial" panose="020B0604020202020204" pitchFamily="34" charset="0"/>
+              </a:rPr>
+              <a:t>13.2 Het ontwerpen van een mechanisme voor uitwerping van de biljetten. </a:t>
+            </a:r>
+            <a:endParaRPr lang="nl-NL" dirty="0">
+              <a:latin typeface="Aptos" panose="020B0004020202020204" pitchFamily="34" charset="0"/>
+              <a:cs typeface="Arial" panose="020B0604020202020204" pitchFamily="34" charset="0"/>
+            </a:endParaRPr>
+          </a:p>
+        </p:txBody>
+      </p:sp>
+      <p:pic>
+        <p:nvPicPr>
+          <p:cNvPr id="7" name="Afbeelding 6" descr="Digitale verbindingen">
+            <a:extLst>
+              <a:ext uri="{FF2B5EF4-FFF2-40B4-BE49-F238E27FC236}">
+                <a16:creationId xmlns:a16="http://schemas.microsoft.com/office/drawing/2014/main" id="{3840F91C-EDD0-4D4E-A4AB-E6C77856C88C}"/>
+              </a:ext>
+            </a:extLst>
+          </p:cNvPr>
+          <p:cNvPicPr>
+            <a:picLocks noChangeAspect="1"/>
+          </p:cNvPicPr>
+          <p:nvPr/>
+        </p:nvPicPr>
+        <p:blipFill rotWithShape="1">
+          <a:blip r:embed="rId3" cstate="screen">
+            <a:extLst>
+              <a:ext uri="{28A0092B-C50C-407E-A947-70E740481C1C}">
+                <a14:useLocalDpi xmlns:a14="http://schemas.microsoft.com/office/drawing/2010/main"/>
+              </a:ext>
+            </a:extLst>
+          </a:blip>
+          <a:srcRect l="13265" t="9091" r="3502" b="-1"/>
+          <a:stretch/>
+        </p:blipFill>
+        <p:spPr>
+          <a:xfrm>
+            <a:off x="6188417" y="2519476"/>
+            <a:ext cx="5422392" cy="3050100"/>
+          </a:xfrm>
+          <a:prstGeom prst="rect">
+            <a:avLst/>
+          </a:prstGeom>
+          <a:noFill/>
+        </p:spPr>
+      </p:pic>
     </p:spTree>
     <p:extLst>
       <p:ext uri="{BB962C8B-B14F-4D97-AF65-F5344CB8AC3E}">
-        <p14:creationId xmlns:p14="http://schemas.microsoft.com/office/powerpoint/2010/main" val="339159220"/>
+        <p14:creationId xmlns:p14="http://schemas.microsoft.com/office/powerpoint/2010/main" val="1958458776"/>
+      </p:ext>
+    </p:extLst>
+  </p:cSld>
+  <p:clrMapOvr>
+    <a:masterClrMapping/>
+  </p:clrMapOvr>
+</p:sld>
+</file>
+
+<file path=ppt/slides/slide11.xml><?xml version="1.0" encoding="utf-8"?>
+<p:sld xmlns:a="http://schemas.openxmlformats.org/drawingml/2006/main" xmlns:r="http://schemas.openxmlformats.org/officeDocument/2006/relationships" xmlns:p="http://schemas.openxmlformats.org/presentationml/2006/main">
+  <p:cSld>
+    <p:spTree>
+      <p:nvGrpSpPr>
+        <p:cNvPr id="1" name=""/>
+        <p:cNvGrpSpPr/>
+        <p:nvPr/>
+      </p:nvGrpSpPr>
+      <p:grpSpPr>
+        <a:xfrm>
+          <a:off x="0" y="0"/>
+          <a:ext cx="0" cy="0"/>
+          <a:chOff x="0" y="0"/>
+          <a:chExt cx="0" cy="0"/>
+        </a:xfrm>
+      </p:grpSpPr>
+      <p:sp>
+        <p:nvSpPr>
+          <p:cNvPr id="2" name="Titel 1">
+            <a:extLst>
+              <a:ext uri="{FF2B5EF4-FFF2-40B4-BE49-F238E27FC236}">
+                <a16:creationId xmlns:a16="http://schemas.microsoft.com/office/drawing/2014/main" id="{C02C5318-1A1E-49D0-B2E2-A4B0FA9E8A40}"/>
+              </a:ext>
+            </a:extLst>
+          </p:cNvPr>
+          <p:cNvSpPr>
+            <a:spLocks noGrp="1"/>
+          </p:cNvSpPr>
+          <p:nvPr>
+            <p:ph type="title"/>
+          </p:nvPr>
+        </p:nvSpPr>
+        <p:spPr>
+          <a:xfrm>
+            <a:off x="581193" y="729658"/>
+            <a:ext cx="11029616" cy="988332"/>
+          </a:xfrm>
+        </p:spPr>
+        <p:txBody>
+          <a:bodyPr rtlCol="0" anchor="b">
+            <a:normAutofit/>
+          </a:bodyPr>
+          <a:lstStyle/>
+          <a:p>
+            <a:pPr rtl="0"/>
+            <a:r>
+              <a:rPr lang="en-GB" dirty="0"/>
+              <a:t>prototype BANK design</a:t>
+            </a:r>
+            <a:endParaRPr lang="nl-NL" dirty="0"/>
+          </a:p>
+        </p:txBody>
+      </p:sp>
+      <p:sp>
+        <p:nvSpPr>
+          <p:cNvPr id="3" name="Subtitel 2">
+            <a:extLst>
+              <a:ext uri="{FF2B5EF4-FFF2-40B4-BE49-F238E27FC236}">
+                <a16:creationId xmlns:a16="http://schemas.microsoft.com/office/drawing/2014/main" id="{48B6CF59-4E5B-494D-A2F7-97ADD01E6497}"/>
+              </a:ext>
+            </a:extLst>
+          </p:cNvPr>
+          <p:cNvSpPr>
+            <a:spLocks noGrp="1"/>
+          </p:cNvSpPr>
+          <p:nvPr>
+            <p:ph sz="half" idx="1"/>
+          </p:nvPr>
+        </p:nvSpPr>
+        <p:spPr>
+          <a:xfrm>
+            <a:off x="581193" y="2228003"/>
+            <a:ext cx="5422390" cy="3633047"/>
+          </a:xfrm>
+        </p:spPr>
+        <p:txBody>
+          <a:bodyPr rtlCol="0" anchor="ctr">
+            <a:normAutofit/>
+          </a:bodyPr>
+          <a:lstStyle/>
+          <a:p>
+            <a:pPr marL="0" indent="0" rtl="0">
+              <a:buNone/>
+            </a:pPr>
+            <a:r>
+              <a:rPr lang="nl-NL" dirty="0"/>
+              <a:t>US 3:</a:t>
+            </a:r>
+          </a:p>
+          <a:p>
+            <a:pPr marL="0" indent="0" rtl="0">
+              <a:buNone/>
+            </a:pPr>
+            <a:r>
+              <a:rPr lang="nl-NL" sz="1800" dirty="0">
+                <a:effectLst/>
+                <a:latin typeface="Aptos" panose="020B0004020202020204" pitchFamily="34" charset="0"/>
+                <a:ea typeface="Aptos" panose="020B0004020202020204" pitchFamily="34" charset="0"/>
+                <a:cs typeface="Arial" panose="020B0604020202020204" pitchFamily="34" charset="0"/>
+              </a:rPr>
+              <a:t>Als bankeigenaar wil ik dat de pinautomaat in een algemene omgeving bruikbaar is, zodat deze op elke plek, die ik wil, ingezet kan worden.</a:t>
+            </a:r>
+          </a:p>
+          <a:p>
+            <a:pPr marL="0" indent="0" rtl="0">
+              <a:buNone/>
+            </a:pPr>
+            <a:r>
+              <a:rPr lang="nl-NL" dirty="0">
+                <a:latin typeface="Aptos" panose="020B0004020202020204" pitchFamily="34" charset="0"/>
+                <a:cs typeface="Arial" panose="020B0604020202020204" pitchFamily="34" charset="0"/>
+              </a:rPr>
+              <a:t>Taak:</a:t>
+            </a:r>
+          </a:p>
+          <a:p>
+            <a:pPr marL="0" indent="0">
+              <a:buNone/>
+            </a:pPr>
+            <a:r>
+              <a:rPr lang="nl-NL" dirty="0">
+                <a:latin typeface="Aptos" panose="020B0004020202020204" pitchFamily="34" charset="0"/>
+                <a:cs typeface="Arial" panose="020B0604020202020204" pitchFamily="34" charset="0"/>
+              </a:rPr>
+              <a:t>3.1 </a:t>
+            </a:r>
+            <a:r>
+              <a:rPr lang="nl-NL" sz="1800" dirty="0">
+                <a:effectLst/>
+                <a:latin typeface="Aptos" panose="020B0004020202020204" pitchFamily="34" charset="0"/>
+                <a:ea typeface="Aptos" panose="020B0004020202020204" pitchFamily="34" charset="0"/>
+                <a:cs typeface="Arial" panose="020B0604020202020204" pitchFamily="34" charset="0"/>
+              </a:rPr>
+              <a:t>Een prototype voor de pinautomaat ontwerpen.</a:t>
+            </a:r>
+          </a:p>
+          <a:p>
+            <a:pPr marL="0" indent="0" rtl="0">
+              <a:buNone/>
+            </a:pPr>
+            <a:endParaRPr lang="nl-NL" dirty="0"/>
+          </a:p>
+        </p:txBody>
+      </p:sp>
+      <p:pic>
+        <p:nvPicPr>
+          <p:cNvPr id="7" name="Afbeelding 6" descr="Digitale verbindingen">
+            <a:extLst>
+              <a:ext uri="{FF2B5EF4-FFF2-40B4-BE49-F238E27FC236}">
+                <a16:creationId xmlns:a16="http://schemas.microsoft.com/office/drawing/2014/main" id="{3840F91C-EDD0-4D4E-A4AB-E6C77856C88C}"/>
+              </a:ext>
+            </a:extLst>
+          </p:cNvPr>
+          <p:cNvPicPr>
+            <a:picLocks noChangeAspect="1"/>
+          </p:cNvPicPr>
+          <p:nvPr/>
+        </p:nvPicPr>
+        <p:blipFill rotWithShape="1">
+          <a:blip r:embed="rId3" cstate="screen">
+            <a:extLst>
+              <a:ext uri="{28A0092B-C50C-407E-A947-70E740481C1C}">
+                <a14:useLocalDpi xmlns:a14="http://schemas.microsoft.com/office/drawing/2010/main"/>
+              </a:ext>
+            </a:extLst>
+          </a:blip>
+          <a:srcRect l="13265" t="9091" r="3502" b="-1"/>
+          <a:stretch/>
+        </p:blipFill>
+        <p:spPr>
+          <a:xfrm>
+            <a:off x="6188417" y="2519476"/>
+            <a:ext cx="5422392" cy="3050100"/>
+          </a:xfrm>
+          <a:prstGeom prst="rect">
+            <a:avLst/>
+          </a:prstGeom>
+          <a:noFill/>
+        </p:spPr>
+      </p:pic>
+    </p:spTree>
+    <p:extLst>
+      <p:ext uri="{BB962C8B-B14F-4D97-AF65-F5344CB8AC3E}">
+        <p14:creationId xmlns:p14="http://schemas.microsoft.com/office/powerpoint/2010/main" val="1760253119"/>
+      </p:ext>
+    </p:extLst>
+  </p:cSld>
+  <p:clrMapOvr>
+    <a:masterClrMapping/>
+  </p:clrMapOvr>
+</p:sld>
+</file>
+
+<file path=ppt/slides/slide12.xml><?xml version="1.0" encoding="utf-8"?>
+<p:sld xmlns:a="http://schemas.openxmlformats.org/drawingml/2006/main" xmlns:r="http://schemas.openxmlformats.org/officeDocument/2006/relationships" xmlns:p="http://schemas.openxmlformats.org/presentationml/2006/main">
+  <p:cSld>
+    <p:spTree>
+      <p:nvGrpSpPr>
+        <p:cNvPr id="1" name=""/>
+        <p:cNvGrpSpPr/>
+        <p:nvPr/>
+      </p:nvGrpSpPr>
+      <p:grpSpPr>
+        <a:xfrm>
+          <a:off x="0" y="0"/>
+          <a:ext cx="0" cy="0"/>
+          <a:chOff x="0" y="0"/>
+          <a:chExt cx="0" cy="0"/>
+        </a:xfrm>
+      </p:grpSpPr>
+      <p:sp>
+        <p:nvSpPr>
+          <p:cNvPr id="2" name="Titel 1">
+            <a:extLst>
+              <a:ext uri="{FF2B5EF4-FFF2-40B4-BE49-F238E27FC236}">
+                <a16:creationId xmlns:a16="http://schemas.microsoft.com/office/drawing/2014/main" id="{C02C5318-1A1E-49D0-B2E2-A4B0FA9E8A40}"/>
+              </a:ext>
+            </a:extLst>
+          </p:cNvPr>
+          <p:cNvSpPr>
+            <a:spLocks noGrp="1"/>
+          </p:cNvSpPr>
+          <p:nvPr>
+            <p:ph type="title"/>
+          </p:nvPr>
+        </p:nvSpPr>
+        <p:spPr>
+          <a:xfrm>
+            <a:off x="581193" y="729658"/>
+            <a:ext cx="11029616" cy="988332"/>
+          </a:xfrm>
+        </p:spPr>
+        <p:txBody>
+          <a:bodyPr rtlCol="0" anchor="b">
+            <a:normAutofit/>
+          </a:bodyPr>
+          <a:lstStyle/>
+          <a:p>
+            <a:pPr rtl="0"/>
+            <a:r>
+              <a:rPr lang="nl-NL" dirty="0"/>
+              <a:t>Biljet onderzoek</a:t>
+            </a:r>
+          </a:p>
+        </p:txBody>
+      </p:sp>
+      <p:sp>
+        <p:nvSpPr>
+          <p:cNvPr id="3" name="Subtitel 2">
+            <a:extLst>
+              <a:ext uri="{FF2B5EF4-FFF2-40B4-BE49-F238E27FC236}">
+                <a16:creationId xmlns:a16="http://schemas.microsoft.com/office/drawing/2014/main" id="{48B6CF59-4E5B-494D-A2F7-97ADD01E6497}"/>
+              </a:ext>
+            </a:extLst>
+          </p:cNvPr>
+          <p:cNvSpPr>
+            <a:spLocks noGrp="1"/>
+          </p:cNvSpPr>
+          <p:nvPr>
+            <p:ph sz="half" idx="1"/>
+          </p:nvPr>
+        </p:nvSpPr>
+        <p:spPr>
+          <a:xfrm>
+            <a:off x="581193" y="2228003"/>
+            <a:ext cx="5422390" cy="3633047"/>
+          </a:xfrm>
+        </p:spPr>
+        <p:txBody>
+          <a:bodyPr rtlCol="0" anchor="ctr">
+            <a:normAutofit fontScale="85000" lnSpcReduction="10000"/>
+          </a:bodyPr>
+          <a:lstStyle/>
+          <a:p>
+            <a:pPr marL="0" indent="0">
+              <a:buNone/>
+            </a:pPr>
+            <a:r>
+              <a:rPr lang="nl-NL" dirty="0"/>
+              <a:t>US 13:</a:t>
+            </a:r>
+          </a:p>
+          <a:p>
+            <a:pPr marL="0" indent="0">
+              <a:buNone/>
+            </a:pPr>
+            <a:r>
+              <a:rPr lang="nl-NL" b="0" i="0" dirty="0">
+                <a:solidFill>
+                  <a:srgbClr val="000000"/>
+                </a:solidFill>
+                <a:effectLst/>
+                <a:latin typeface="inherit"/>
+              </a:rPr>
+              <a:t>Als gebruiker wil ik graag verschillende biljetten kunnen pinnen zodat ik makkelijker kan betalen.</a:t>
+            </a:r>
+            <a:endParaRPr lang="nl-NL" dirty="0"/>
+          </a:p>
+          <a:p>
+            <a:pPr marL="0" indent="0">
+              <a:buNone/>
+            </a:pPr>
+            <a:r>
+              <a:rPr lang="nl-NL" b="0" i="0" dirty="0">
+                <a:effectLst/>
+                <a:latin typeface="gg sans"/>
+              </a:rPr>
+              <a:t>US 14:</a:t>
+            </a:r>
+          </a:p>
+          <a:p>
+            <a:pPr marL="0" indent="0">
+              <a:buNone/>
+            </a:pPr>
+            <a:r>
+              <a:rPr lang="nl-NL" b="0" i="0" dirty="0">
+                <a:effectLst/>
+                <a:latin typeface="gg sans"/>
+              </a:rPr>
+              <a:t>Als gebruiker wil ik dat er snel keuzes zijn voor handige bedragen zodat ik minder tijd hoef te besteden aan het pinnen.</a:t>
+            </a:r>
+          </a:p>
+          <a:p>
+            <a:pPr marL="0" indent="0">
+              <a:buNone/>
+            </a:pPr>
+            <a:r>
+              <a:rPr lang="nl-NL" dirty="0"/>
+              <a:t>Taken:</a:t>
+            </a:r>
+          </a:p>
+          <a:p>
+            <a:pPr marL="0" indent="0" algn="l" fontAlgn="base">
+              <a:buNone/>
+            </a:pPr>
+            <a:r>
+              <a:rPr lang="nl-NL" dirty="0"/>
+              <a:t>13.1 </a:t>
+            </a:r>
+            <a:r>
+              <a:rPr lang="nl-NL" b="0" i="0" dirty="0">
+                <a:solidFill>
+                  <a:srgbClr val="000000"/>
+                </a:solidFill>
+                <a:effectLst/>
+                <a:latin typeface="inherit"/>
+              </a:rPr>
+              <a:t>Onderzoeken welke biljetten mensen het liefst pinnen.</a:t>
+            </a:r>
+          </a:p>
+          <a:p>
+            <a:pPr marL="0" indent="0" algn="l" fontAlgn="base">
+              <a:buNone/>
+            </a:pPr>
+            <a:r>
+              <a:rPr lang="nl-NL" b="0" i="0" dirty="0">
+                <a:solidFill>
+                  <a:srgbClr val="000000"/>
+                </a:solidFill>
+                <a:effectLst/>
+                <a:latin typeface="inherit"/>
+              </a:rPr>
+              <a:t>14.1 Onderzoeken welke bedragen mensen het vaakst pinnen.</a:t>
+            </a:r>
+          </a:p>
+          <a:p>
+            <a:r>
+              <a:rPr lang="nl-NL" dirty="0"/>
+              <a:t>Sneltoets optie</a:t>
+            </a:r>
+          </a:p>
+          <a:p>
+            <a:r>
+              <a:rPr lang="nl-NL" dirty="0"/>
+              <a:t>Biljet waardes</a:t>
+            </a:r>
+          </a:p>
+        </p:txBody>
+      </p:sp>
+      <p:pic>
+        <p:nvPicPr>
+          <p:cNvPr id="7" name="Afbeelding 6" descr="Digitale verbindingen">
+            <a:extLst>
+              <a:ext uri="{FF2B5EF4-FFF2-40B4-BE49-F238E27FC236}">
+                <a16:creationId xmlns:a16="http://schemas.microsoft.com/office/drawing/2014/main" id="{3840F91C-EDD0-4D4E-A4AB-E6C77856C88C}"/>
+              </a:ext>
+            </a:extLst>
+          </p:cNvPr>
+          <p:cNvPicPr>
+            <a:picLocks noChangeAspect="1"/>
+          </p:cNvPicPr>
+          <p:nvPr/>
+        </p:nvPicPr>
+        <p:blipFill rotWithShape="1">
+          <a:blip r:embed="rId3" cstate="screen">
+            <a:extLst>
+              <a:ext uri="{28A0092B-C50C-407E-A947-70E740481C1C}">
+                <a14:useLocalDpi xmlns:a14="http://schemas.microsoft.com/office/drawing/2010/main"/>
+              </a:ext>
+            </a:extLst>
+          </a:blip>
+          <a:srcRect l="13265" t="9091" r="3502" b="-1"/>
+          <a:stretch/>
+        </p:blipFill>
+        <p:spPr>
+          <a:xfrm>
+            <a:off x="6188417" y="2519476"/>
+            <a:ext cx="5422392" cy="3050100"/>
+          </a:xfrm>
+          <a:prstGeom prst="rect">
+            <a:avLst/>
+          </a:prstGeom>
+          <a:noFill/>
+        </p:spPr>
+      </p:pic>
+    </p:spTree>
+    <p:extLst>
+      <p:ext uri="{BB962C8B-B14F-4D97-AF65-F5344CB8AC3E}">
+        <p14:creationId xmlns:p14="http://schemas.microsoft.com/office/powerpoint/2010/main" val="292187903"/>
+      </p:ext>
+    </p:extLst>
+  </p:cSld>
+  <p:clrMapOvr>
+    <a:masterClrMapping/>
+  </p:clrMapOvr>
+</p:sld>
+</file>
+
+<file path=ppt/slides/slide13.xml><?xml version="1.0" encoding="utf-8"?>
+<p:sld xmlns:a="http://schemas.openxmlformats.org/drawingml/2006/main" xmlns:r="http://schemas.openxmlformats.org/officeDocument/2006/relationships" xmlns:p="http://schemas.openxmlformats.org/presentationml/2006/main">
+  <p:cSld>
+    <p:spTree>
+      <p:nvGrpSpPr>
+        <p:cNvPr id="1" name=""/>
+        <p:cNvGrpSpPr/>
+        <p:nvPr/>
+      </p:nvGrpSpPr>
+      <p:grpSpPr>
+        <a:xfrm>
+          <a:off x="0" y="0"/>
+          <a:ext cx="0" cy="0"/>
+          <a:chOff x="0" y="0"/>
+          <a:chExt cx="0" cy="0"/>
+        </a:xfrm>
+      </p:grpSpPr>
+      <p:sp>
+        <p:nvSpPr>
+          <p:cNvPr id="2" name="Titel 1">
+            <a:extLst>
+              <a:ext uri="{FF2B5EF4-FFF2-40B4-BE49-F238E27FC236}">
+                <a16:creationId xmlns:a16="http://schemas.microsoft.com/office/drawing/2014/main" id="{C02C5318-1A1E-49D0-B2E2-A4B0FA9E8A40}"/>
+              </a:ext>
+            </a:extLst>
+          </p:cNvPr>
+          <p:cNvSpPr>
+            <a:spLocks noGrp="1"/>
+          </p:cNvSpPr>
+          <p:nvPr>
+            <p:ph type="title"/>
+          </p:nvPr>
+        </p:nvSpPr>
+        <p:spPr>
+          <a:xfrm>
+            <a:off x="581193" y="729658"/>
+            <a:ext cx="11029616" cy="988332"/>
+          </a:xfrm>
+        </p:spPr>
+        <p:txBody>
+          <a:bodyPr rtlCol="0" anchor="b">
+            <a:normAutofit/>
+          </a:bodyPr>
+          <a:lstStyle/>
+          <a:p>
+            <a:pPr rtl="0"/>
+            <a:r>
+              <a:rPr lang="nl-NL" dirty="0"/>
+              <a:t>samenwerking</a:t>
+            </a:r>
+          </a:p>
+        </p:txBody>
+      </p:sp>
+      <p:sp>
+        <p:nvSpPr>
+          <p:cNvPr id="3" name="Subtitel 2">
+            <a:extLst>
+              <a:ext uri="{FF2B5EF4-FFF2-40B4-BE49-F238E27FC236}">
+                <a16:creationId xmlns:a16="http://schemas.microsoft.com/office/drawing/2014/main" id="{48B6CF59-4E5B-494D-A2F7-97ADD01E6497}"/>
+              </a:ext>
+            </a:extLst>
+          </p:cNvPr>
+          <p:cNvSpPr>
+            <a:spLocks noGrp="1"/>
+          </p:cNvSpPr>
+          <p:nvPr>
+            <p:ph sz="half" idx="1"/>
+          </p:nvPr>
+        </p:nvSpPr>
+        <p:spPr>
+          <a:xfrm>
+            <a:off x="581193" y="2228003"/>
+            <a:ext cx="5422390" cy="3633047"/>
+          </a:xfrm>
+        </p:spPr>
+        <p:txBody>
+          <a:bodyPr rtlCol="0" anchor="ctr">
+            <a:normAutofit/>
+          </a:bodyPr>
+          <a:lstStyle/>
+          <a:p>
+            <a:r>
+              <a:rPr lang="nl-NL" dirty="0"/>
+              <a:t>Algemeen ging goed</a:t>
+            </a:r>
+          </a:p>
+          <a:p>
+            <a:r>
+              <a:rPr lang="nl-NL" dirty="0"/>
+              <a:t>Weinig tot geen communicatie met afwezige teamgenoot</a:t>
+            </a:r>
+          </a:p>
+          <a:p>
+            <a:endParaRPr lang="nl-NL" dirty="0"/>
+          </a:p>
+        </p:txBody>
+      </p:sp>
+      <p:pic>
+        <p:nvPicPr>
+          <p:cNvPr id="7" name="Afbeelding 6" descr="Digitale verbindingen">
+            <a:extLst>
+              <a:ext uri="{FF2B5EF4-FFF2-40B4-BE49-F238E27FC236}">
+                <a16:creationId xmlns:a16="http://schemas.microsoft.com/office/drawing/2014/main" id="{3840F91C-EDD0-4D4E-A4AB-E6C77856C88C}"/>
+              </a:ext>
+            </a:extLst>
+          </p:cNvPr>
+          <p:cNvPicPr>
+            <a:picLocks noChangeAspect="1"/>
+          </p:cNvPicPr>
+          <p:nvPr/>
+        </p:nvPicPr>
+        <p:blipFill rotWithShape="1">
+          <a:blip r:embed="rId3" cstate="screen">
+            <a:extLst>
+              <a:ext uri="{28A0092B-C50C-407E-A947-70E740481C1C}">
+                <a14:useLocalDpi xmlns:a14="http://schemas.microsoft.com/office/drawing/2010/main"/>
+              </a:ext>
+            </a:extLst>
+          </a:blip>
+          <a:srcRect l="13265" t="9091" r="3502" b="-1"/>
+          <a:stretch/>
+        </p:blipFill>
+        <p:spPr>
+          <a:xfrm>
+            <a:off x="6188417" y="2519476"/>
+            <a:ext cx="5422392" cy="3050100"/>
+          </a:xfrm>
+          <a:prstGeom prst="rect">
+            <a:avLst/>
+          </a:prstGeom>
+          <a:noFill/>
+        </p:spPr>
+      </p:pic>
+    </p:spTree>
+    <p:extLst>
+      <p:ext uri="{BB962C8B-B14F-4D97-AF65-F5344CB8AC3E}">
+        <p14:creationId xmlns:p14="http://schemas.microsoft.com/office/powerpoint/2010/main" val="2704696244"/>
+      </p:ext>
+    </p:extLst>
+  </p:cSld>
+  <p:clrMapOvr>
+    <a:masterClrMapping/>
+  </p:clrMapOvr>
+</p:sld>
+</file>
+
+<file path=ppt/slides/slide14.xml><?xml version="1.0" encoding="utf-8"?>
+<p:sld xmlns:a="http://schemas.openxmlformats.org/drawingml/2006/main" xmlns:r="http://schemas.openxmlformats.org/officeDocument/2006/relationships" xmlns:p="http://schemas.openxmlformats.org/presentationml/2006/main">
+  <p:cSld>
+    <p:spTree>
+      <p:nvGrpSpPr>
+        <p:cNvPr id="1" name=""/>
+        <p:cNvGrpSpPr/>
+        <p:nvPr/>
+      </p:nvGrpSpPr>
+      <p:grpSpPr>
+        <a:xfrm>
+          <a:off x="0" y="0"/>
+          <a:ext cx="0" cy="0"/>
+          <a:chOff x="0" y="0"/>
+          <a:chExt cx="0" cy="0"/>
+        </a:xfrm>
+      </p:grpSpPr>
+      <p:sp>
+        <p:nvSpPr>
+          <p:cNvPr id="2" name="Titel 1">
+            <a:extLst>
+              <a:ext uri="{FF2B5EF4-FFF2-40B4-BE49-F238E27FC236}">
+                <a16:creationId xmlns:a16="http://schemas.microsoft.com/office/drawing/2014/main" id="{C02C5318-1A1E-49D0-B2E2-A4B0FA9E8A40}"/>
+              </a:ext>
+            </a:extLst>
+          </p:cNvPr>
+          <p:cNvSpPr>
+            <a:spLocks noGrp="1"/>
+          </p:cNvSpPr>
+          <p:nvPr>
+            <p:ph type="title"/>
+          </p:nvPr>
+        </p:nvSpPr>
+        <p:spPr>
+          <a:xfrm>
+            <a:off x="581193" y="729658"/>
+            <a:ext cx="11029616" cy="988332"/>
+          </a:xfrm>
+        </p:spPr>
+        <p:txBody>
+          <a:bodyPr rtlCol="0" anchor="b">
+            <a:normAutofit/>
+          </a:bodyPr>
+          <a:lstStyle/>
+          <a:p>
+            <a:pPr rtl="0"/>
+            <a:r>
+              <a:rPr lang="nl-NL" dirty="0"/>
+              <a:t>Komende sprint</a:t>
+            </a:r>
+          </a:p>
+        </p:txBody>
+      </p:sp>
+      <p:sp>
+        <p:nvSpPr>
+          <p:cNvPr id="3" name="Subtitel 2">
+            <a:extLst>
+              <a:ext uri="{FF2B5EF4-FFF2-40B4-BE49-F238E27FC236}">
+                <a16:creationId xmlns:a16="http://schemas.microsoft.com/office/drawing/2014/main" id="{48B6CF59-4E5B-494D-A2F7-97ADD01E6497}"/>
+              </a:ext>
+            </a:extLst>
+          </p:cNvPr>
+          <p:cNvSpPr>
+            <a:spLocks noGrp="1"/>
+          </p:cNvSpPr>
+          <p:nvPr>
+            <p:ph sz="half" idx="1"/>
+          </p:nvPr>
+        </p:nvSpPr>
+        <p:spPr>
+          <a:xfrm>
+            <a:off x="581193" y="2228003"/>
+            <a:ext cx="5422390" cy="3633047"/>
+          </a:xfrm>
+        </p:spPr>
+        <p:txBody>
+          <a:bodyPr rtlCol="0" anchor="ctr">
+            <a:normAutofit fontScale="92500" lnSpcReduction="10000"/>
+          </a:bodyPr>
+          <a:lstStyle/>
+          <a:p>
+            <a:r>
+              <a:rPr lang="nl-NL" dirty="0"/>
+              <a:t>US 9 afronden – </a:t>
+            </a:r>
+            <a:r>
+              <a:rPr lang="nl-NL" b="0" i="0" dirty="0">
+                <a:effectLst/>
+                <a:latin typeface="gg sans"/>
+              </a:rPr>
+              <a:t>Als gebruiker wil ik op een scherm kunnen zien wat ik aan het doen ben zodat ik kan zien wat ik aan het doen ben.</a:t>
+            </a:r>
+          </a:p>
+          <a:p>
+            <a:pPr lvl="1">
+              <a:buFont typeface="Wingdings" panose="05000000000000000000" pitchFamily="2" charset="2"/>
+              <a:buChar char="Ø"/>
+            </a:pPr>
+            <a:r>
+              <a:rPr lang="nl-NL" dirty="0"/>
+              <a:t>9.3 Code schrijven om GUI te realiseren.</a:t>
+            </a:r>
+          </a:p>
+          <a:p>
+            <a:r>
+              <a:rPr lang="nl-NL" dirty="0"/>
+              <a:t>US 13 starten - </a:t>
+            </a:r>
+            <a:r>
+              <a:rPr lang="nl-NL" b="0" i="0" dirty="0">
+                <a:solidFill>
+                  <a:srgbClr val="000000"/>
+                </a:solidFill>
+                <a:effectLst/>
+                <a:latin typeface="inherit"/>
+              </a:rPr>
+              <a:t>Als gebruiker wil ik graag verschillende biljetten kunnen pinnen zodat ik makkelijker kan betalen.</a:t>
+            </a:r>
+          </a:p>
+          <a:p>
+            <a:pPr lvl="1">
+              <a:buFont typeface="Wingdings" panose="05000000000000000000" pitchFamily="2" charset="2"/>
+              <a:buChar char="Ø"/>
+            </a:pPr>
+            <a:r>
+              <a:rPr lang="nl-NL" dirty="0"/>
+              <a:t>13.1 Een uitwerp mechanisme voor de biljetten ontwerpen.</a:t>
+            </a:r>
+          </a:p>
+          <a:p>
+            <a:pPr>
+              <a:buFont typeface="Wingdings" panose="05000000000000000000" pitchFamily="2" charset="2"/>
+              <a:buChar char="§"/>
+            </a:pPr>
+            <a:r>
+              <a:rPr lang="nl-NL" dirty="0"/>
+              <a:t>US 11 starten - </a:t>
+            </a:r>
+            <a:r>
+              <a:rPr lang="nl-NL" b="0" i="0" dirty="0">
+                <a:solidFill>
+                  <a:srgbClr val="000000"/>
+                </a:solidFill>
+                <a:effectLst/>
+                <a:latin typeface="inherit"/>
+              </a:rPr>
+              <a:t>Als gebruiker wil ik dat er een numeriek toetsenbord is zodat ik mijn pincode en een bedrag naar keuze kan invoeren.</a:t>
+            </a:r>
+          </a:p>
+          <a:p>
+            <a:pPr lvl="1">
+              <a:buFont typeface="Wingdings" panose="05000000000000000000" pitchFamily="2" charset="2"/>
+              <a:buChar char="Ø"/>
+            </a:pPr>
+            <a:r>
+              <a:rPr lang="nl-NL" dirty="0"/>
+              <a:t>11.1 Het ontwerpen van een numeriek toetsenbord.</a:t>
+            </a:r>
+          </a:p>
+        </p:txBody>
+      </p:sp>
+      <p:pic>
+        <p:nvPicPr>
+          <p:cNvPr id="7" name="Afbeelding 6" descr="Digitale verbindingen">
+            <a:extLst>
+              <a:ext uri="{FF2B5EF4-FFF2-40B4-BE49-F238E27FC236}">
+                <a16:creationId xmlns:a16="http://schemas.microsoft.com/office/drawing/2014/main" id="{3840F91C-EDD0-4D4E-A4AB-E6C77856C88C}"/>
+              </a:ext>
+            </a:extLst>
+          </p:cNvPr>
+          <p:cNvPicPr>
+            <a:picLocks noChangeAspect="1"/>
+          </p:cNvPicPr>
+          <p:nvPr/>
+        </p:nvPicPr>
+        <p:blipFill rotWithShape="1">
+          <a:blip r:embed="rId3" cstate="screen">
+            <a:extLst>
+              <a:ext uri="{28A0092B-C50C-407E-A947-70E740481C1C}">
+                <a14:useLocalDpi xmlns:a14="http://schemas.microsoft.com/office/drawing/2010/main"/>
+              </a:ext>
+            </a:extLst>
+          </a:blip>
+          <a:srcRect l="13265" t="9091" r="3502" b="-1"/>
+          <a:stretch/>
+        </p:blipFill>
+        <p:spPr>
+          <a:xfrm>
+            <a:off x="6188417" y="2519476"/>
+            <a:ext cx="5422392" cy="3050100"/>
+          </a:xfrm>
+          <a:prstGeom prst="rect">
+            <a:avLst/>
+          </a:prstGeom>
+          <a:noFill/>
+        </p:spPr>
+      </p:pic>
+    </p:spTree>
+    <p:extLst>
+      <p:ext uri="{BB962C8B-B14F-4D97-AF65-F5344CB8AC3E}">
+        <p14:creationId xmlns:p14="http://schemas.microsoft.com/office/powerpoint/2010/main" val="3312310576"/>
       </p:ext>
     </p:extLst>
   </p:cSld>
@@ -5479,23 +7229,7 @@
                   <a:srgbClr val="FFFEFF"/>
                 </a:solidFill>
               </a:rPr>
-              <a:t>De </a:t>
-            </a:r>
-            <a:r>
-              <a:rPr lang="en-GB" dirty="0" err="1">
-                <a:solidFill>
-                  <a:srgbClr val="FFFEFF"/>
-                </a:solidFill>
-              </a:rPr>
-              <a:t>geplande</a:t>
-            </a:r>
-            <a:r>
-              <a:rPr lang="en-GB" dirty="0">
-                <a:solidFill>
-                  <a:srgbClr val="FFFEFF"/>
-                </a:solidFill>
-              </a:rPr>
-              <a:t> sprint</a:t>
+              <a:t>De sprint</a:t>
             </a:r>
             <a:endParaRPr lang="nl-NL" dirty="0">
               <a:solidFill>
@@ -5528,7 +7262,9 @@
           </a:xfrm>
         </p:spPr>
         <p:txBody>
-          <a:bodyPr/>
+          <a:bodyPr>
+            <a:normAutofit fontScale="92500" lnSpcReduction="10000"/>
+          </a:bodyPr>
           <a:lstStyle/>
           <a:p>
             <a:r>
@@ -5545,6 +7281,12 @@
           <a:p>
             <a:r>
               <a:rPr lang="nl-NL" dirty="0"/>
+              <a:t>Demo en uitbreiding bon printer</a:t>
+            </a:r>
+          </a:p>
+          <a:p>
+            <a:r>
+              <a:rPr lang="nl-NL" dirty="0"/>
               <a:t>Onderzoek doen naar display screen</a:t>
             </a:r>
           </a:p>
@@ -5560,17 +7302,33 @@
             <a:endParaRPr lang="nl-NL" dirty="0"/>
           </a:p>
           <a:p>
-            <a:r>
-              <a:rPr lang="nl-NL" strike="sngStrike" dirty="0"/>
+            <a:pPr>
+              <a:buClr>
+                <a:srgbClr val="0070C0"/>
+              </a:buClr>
+            </a:pPr>
+            <a:r>
+              <a:rPr lang="nl-NL" dirty="0"/>
               <a:t>Prototype gui/</a:t>
             </a:r>
             <a:r>
-              <a:rPr lang="nl-NL" strike="sngStrike" dirty="0" err="1"/>
+              <a:rPr lang="nl-NL" dirty="0" err="1"/>
               <a:t>interactables</a:t>
             </a:r>
             <a:r>
-              <a:rPr lang="nl-NL" strike="sngStrike" dirty="0"/>
+              <a:rPr lang="nl-NL" dirty="0"/>
               <a:t> pinautomaat</a:t>
+            </a:r>
+          </a:p>
+          <a:p>
+            <a:pPr>
+              <a:buClr>
+                <a:srgbClr val="0070C0"/>
+              </a:buClr>
+            </a:pPr>
+            <a:r>
+              <a:rPr lang="nl-NL" dirty="0"/>
+              <a:t>Prototype biljet uitwerper</a:t>
             </a:r>
           </a:p>
           <a:p>
@@ -5580,25 +7338,20 @@
             </a:r>
           </a:p>
           <a:p>
+            <a:r>
+              <a:rPr lang="nl-NL" dirty="0"/>
+              <a:t>Biljet onderzoek</a:t>
+            </a:r>
+          </a:p>
+          <a:p>
             <a:pPr>
               <a:buClr>
-                <a:schemeClr val="accent1"/>
+                <a:srgbClr val="0070C0"/>
               </a:buClr>
             </a:pPr>
             <a:r>
               <a:rPr lang="nl-NL" dirty="0"/>
-              <a:t>Biljet onderzoek</a:t>
-            </a:r>
-          </a:p>
-          <a:p>
-            <a:pPr>
-              <a:buClr>
-                <a:schemeClr val="accent1"/>
-              </a:buClr>
-            </a:pPr>
-            <a:r>
-              <a:rPr lang="nl-NL" dirty="0"/>
-              <a:t>Knop design</a:t>
+              <a:t>Prototype Bank design</a:t>
             </a:r>
           </a:p>
         </p:txBody>
@@ -5980,6 +7733,72 @@
             <a:pPr marL="0" indent="0" algn="ctr">
               <a:buNone/>
             </a:pPr>
+            <a:r>
+              <a:rPr lang="en-GB" sz="2000" dirty="0">
+                <a:solidFill>
+                  <a:schemeClr val="bg1"/>
+                </a:solidFill>
+              </a:rPr>
+              <a:t>US 25:</a:t>
+            </a:r>
+          </a:p>
+          <a:p>
+            <a:pPr marL="0" indent="0" algn="ctr">
+              <a:buNone/>
+            </a:pPr>
+            <a:r>
+              <a:rPr lang="nl-NL" sz="1800" dirty="0">
+                <a:solidFill>
+                  <a:schemeClr val="bg1"/>
+                </a:solidFill>
+                <a:effectLst/>
+                <a:latin typeface="Aptos" panose="020B0004020202020204" pitchFamily="34" charset="0"/>
+                <a:ea typeface="Aptos" panose="020B0004020202020204" pitchFamily="34" charset="0"/>
+                <a:cs typeface="Arial" panose="020B0604020202020204" pitchFamily="34" charset="0"/>
+              </a:rPr>
+              <a:t>Als bank eigenaar wil ik dat mijn bank een naam heeft zodat men weet bij welke bank ze aan het pinnen zijn</a:t>
+            </a:r>
+            <a:r>
+              <a:rPr lang="nl-NL" sz="1800" dirty="0">
+                <a:effectLst/>
+                <a:latin typeface="Aptos" panose="020B0004020202020204" pitchFamily="34" charset="0"/>
+                <a:ea typeface="Aptos" panose="020B0004020202020204" pitchFamily="34" charset="0"/>
+                <a:cs typeface="Arial" panose="020B0604020202020204" pitchFamily="34" charset="0"/>
+              </a:rPr>
+              <a:t>.</a:t>
+            </a:r>
+          </a:p>
+          <a:p>
+            <a:pPr marL="0" indent="0" algn="ctr">
+              <a:buNone/>
+            </a:pPr>
+            <a:r>
+              <a:rPr lang="nl-NL" dirty="0">
+                <a:solidFill>
+                  <a:schemeClr val="bg1"/>
+                </a:solidFill>
+                <a:latin typeface="Aptos" panose="020B0004020202020204" pitchFamily="34" charset="0"/>
+                <a:cs typeface="Arial" panose="020B0604020202020204" pitchFamily="34" charset="0"/>
+              </a:rPr>
+              <a:t>Taak:</a:t>
+            </a:r>
+          </a:p>
+          <a:p>
+            <a:pPr marL="0" indent="0" algn="ctr">
+              <a:buNone/>
+            </a:pPr>
+            <a:r>
+              <a:rPr lang="nl-NL" sz="1800" dirty="0">
+                <a:solidFill>
+                  <a:schemeClr val="bg1"/>
+                </a:solidFill>
+                <a:effectLst/>
+                <a:latin typeface="Aptos" panose="020B0004020202020204" pitchFamily="34" charset="0"/>
+                <a:ea typeface="Aptos" panose="020B0004020202020204" pitchFamily="34" charset="0"/>
+                <a:cs typeface="Arial" panose="020B0604020202020204" pitchFamily="34" charset="0"/>
+              </a:rPr>
+              <a:t>25.1 Het creëren van een naam voor de bank.</a:t>
+            </a:r>
             <a:endParaRPr lang="en-GB" sz="2000" dirty="0">
               <a:solidFill>
                 <a:schemeClr val="bg1"/>
@@ -6148,13 +7967,13 @@
   <p:clrMapOvr>
     <a:masterClrMapping/>
   </p:clrMapOvr>
-  <mc:AlternateContent xmlns:mc="http://schemas.openxmlformats.org/markup-compatibility/2006">
-    <mc:Choice xmlns:p15="http://schemas.microsoft.com/office/powerpoint/2012/main" Requires="p15">
+  <mc:AlternateContent xmlns:mc="http://schemas.openxmlformats.org/markup-compatibility/2006" xmlns:p15="http://schemas.microsoft.com/office/powerpoint/2012/main">
+    <mc:Choice Requires="p15">
       <p:transition xmlns:p14="http://schemas.microsoft.com/office/powerpoint/2010/main" spd="slow" p14:dur="2000">
         <p15:prstTrans prst="prestige"/>
       </p:transition>
     </mc:Choice>
-    <mc:Fallback>
+    <mc:Fallback xmlns="">
       <p:transition spd="slow">
         <p:fade/>
       </p:transition>
@@ -6276,7 +8095,7 @@
           <p:cNvPr id="2" name="Titel 1">
             <a:extLst>
               <a:ext uri="{FF2B5EF4-FFF2-40B4-BE49-F238E27FC236}">
-                <a16:creationId xmlns:a16="http://schemas.microsoft.com/office/drawing/2014/main" id="{BFF97612-7DFF-ADB7-5A94-95D49C8AB6FC}"/>
+                <a16:creationId xmlns:a16="http://schemas.microsoft.com/office/drawing/2014/main" id="{C02C5318-1A1E-49D0-B2E2-A4B0FA9E8A40}"/>
               </a:ext>
             </a:extLst>
           </p:cNvPr>
@@ -6287,11 +8106,19 @@
             <p:ph type="title"/>
           </p:nvPr>
         </p:nvSpPr>
-        <p:spPr/>
-        <p:txBody>
-          <a:bodyPr/>
+        <p:spPr>
+          <a:xfrm>
+            <a:off x="581193" y="729658"/>
+            <a:ext cx="11029616" cy="988332"/>
+          </a:xfrm>
+        </p:spPr>
+        <p:txBody>
+          <a:bodyPr rtlCol="0" anchor="b">
+            <a:normAutofit/>
+          </a:bodyPr>
           <a:lstStyle/>
           <a:p>
+            <a:pPr rtl="0"/>
             <a:r>
               <a:rPr lang="nl-NL" dirty="0"/>
               <a:t>Behuizing bon printer prototype</a:t>
@@ -6301,10 +8128,10 @@
       </p:sp>
       <p:sp>
         <p:nvSpPr>
-          <p:cNvPr id="3" name="Tijdelijke aanduiding voor inhoud 2">
+          <p:cNvPr id="3" name="Subtitel 2">
             <a:extLst>
               <a:ext uri="{FF2B5EF4-FFF2-40B4-BE49-F238E27FC236}">
-                <a16:creationId xmlns:a16="http://schemas.microsoft.com/office/drawing/2014/main" id="{8483DFE9-C570-224A-1F78-54080277AA6F}"/>
+                <a16:creationId xmlns:a16="http://schemas.microsoft.com/office/drawing/2014/main" id="{48B6CF59-4E5B-494D-A2F7-97ADD01E6497}"/>
               </a:ext>
             </a:extLst>
           </p:cNvPr>
@@ -6312,22 +8139,150 @@
             <a:spLocks noGrp="1"/>
           </p:cNvSpPr>
           <p:nvPr>
-            <p:ph idx="1"/>
-          </p:nvPr>
-        </p:nvSpPr>
-        <p:spPr/>
-        <p:txBody>
-          <a:bodyPr/>
+            <p:ph sz="half" idx="1"/>
+          </p:nvPr>
+        </p:nvSpPr>
+        <p:spPr>
+          <a:xfrm>
+            <a:off x="581193" y="2228003"/>
+            <a:ext cx="5422390" cy="3633047"/>
+          </a:xfrm>
+        </p:spPr>
+        <p:txBody>
+          <a:bodyPr rtlCol="0" anchor="ctr">
+            <a:normAutofit/>
+          </a:bodyPr>
           <a:lstStyle/>
           <a:p>
-            <a:endParaRPr lang="nl-NL"/>
-          </a:p>
-        </p:txBody>
-      </p:sp>
+            <a:pPr marL="0" indent="0" rtl="0">
+              <a:buNone/>
+            </a:pPr>
+            <a:r>
+              <a:rPr lang="nl-NL" dirty="0"/>
+              <a:t>US 5:</a:t>
+            </a:r>
+          </a:p>
+          <a:p>
+            <a:pPr marL="0" indent="0" rtl="0">
+              <a:buNone/>
+            </a:pPr>
+            <a:r>
+              <a:rPr lang="nl-NL" sz="1800" dirty="0">
+                <a:effectLst/>
+                <a:latin typeface="Aptos" panose="020B0004020202020204" pitchFamily="34" charset="0"/>
+                <a:ea typeface="Aptos" panose="020B0004020202020204" pitchFamily="34" charset="0"/>
+                <a:cs typeface="Arial" panose="020B0604020202020204" pitchFamily="34" charset="0"/>
+              </a:rPr>
+              <a:t>Als gebruiker wil ik dat het gepinde bedrag en de datum en tijd op de bon staat zodat ik dit kan laten zien aan de bank mocht er iets fout  gaan met de transactie.</a:t>
+            </a:r>
+          </a:p>
+          <a:p>
+            <a:pPr marL="0" indent="0" rtl="0">
+              <a:buNone/>
+            </a:pPr>
+            <a:r>
+              <a:rPr lang="nl-NL" dirty="0">
+                <a:latin typeface="Aptos" panose="020B0004020202020204" pitchFamily="34" charset="0"/>
+                <a:cs typeface="Arial" panose="020B0604020202020204" pitchFamily="34" charset="0"/>
+              </a:rPr>
+              <a:t>Taken:</a:t>
+            </a:r>
+          </a:p>
+          <a:p>
+            <a:pPr marL="0" indent="0">
+              <a:buNone/>
+            </a:pPr>
+            <a:r>
+              <a:rPr lang="nl-NL" sz="1800" dirty="0">
+                <a:effectLst/>
+                <a:latin typeface="Aptos" panose="020B0004020202020204" pitchFamily="34" charset="0"/>
+                <a:ea typeface="Aptos" panose="020B0004020202020204" pitchFamily="34" charset="0"/>
+                <a:cs typeface="Arial" panose="020B0604020202020204" pitchFamily="34" charset="0"/>
+              </a:rPr>
+              <a:t>5.5 Het ontwerpen van de behuizing voor de bon printer.</a:t>
+            </a:r>
+          </a:p>
+          <a:p>
+            <a:pPr marL="0" indent="0">
+              <a:buNone/>
+            </a:pPr>
+            <a:r>
+              <a:rPr lang="nl-NL" dirty="0">
+                <a:latin typeface="Aptos" panose="020B0004020202020204" pitchFamily="34" charset="0"/>
+                <a:ea typeface="Aptos" panose="020B0004020202020204" pitchFamily="34" charset="0"/>
+                <a:cs typeface="Arial" panose="020B0604020202020204" pitchFamily="34" charset="0"/>
+              </a:rPr>
+              <a:t>5.6 </a:t>
+            </a:r>
+            <a:r>
+              <a:rPr lang="nl-NL" sz="1800" dirty="0">
+                <a:effectLst/>
+                <a:latin typeface="Aptos" panose="020B0004020202020204" pitchFamily="34" charset="0"/>
+                <a:ea typeface="Aptos" panose="020B0004020202020204" pitchFamily="34" charset="0"/>
+                <a:cs typeface="Arial" panose="020B0604020202020204" pitchFamily="34" charset="0"/>
+              </a:rPr>
+              <a:t>Het realiseren van de behuizing van de bon printer.</a:t>
+            </a:r>
+          </a:p>
+          <a:p>
+            <a:pPr marL="0" indent="0">
+              <a:buNone/>
+            </a:pPr>
+            <a:endParaRPr lang="nl-NL" sz="1800" dirty="0">
+              <a:effectLst/>
+              <a:latin typeface="Aptos" panose="020B0004020202020204" pitchFamily="34" charset="0"/>
+              <a:ea typeface="Aptos" panose="020B0004020202020204" pitchFamily="34" charset="0"/>
+              <a:cs typeface="Arial" panose="020B0604020202020204" pitchFamily="34" charset="0"/>
+            </a:endParaRPr>
+          </a:p>
+          <a:p>
+            <a:pPr marL="0" indent="0" rtl="0">
+              <a:buNone/>
+            </a:pPr>
+            <a:endParaRPr lang="nl-NL" dirty="0"/>
+          </a:p>
+        </p:txBody>
+      </p:sp>
+      <p:pic>
+        <p:nvPicPr>
+          <p:cNvPr id="7" name="Afbeelding 6" descr="Digitale verbindingen">
+            <a:extLst>
+              <a:ext uri="{FF2B5EF4-FFF2-40B4-BE49-F238E27FC236}">
+                <a16:creationId xmlns:a16="http://schemas.microsoft.com/office/drawing/2014/main" id="{3840F91C-EDD0-4D4E-A4AB-E6C77856C88C}"/>
+              </a:ext>
+            </a:extLst>
+          </p:cNvPr>
+          <p:cNvPicPr>
+            <a:picLocks noChangeAspect="1"/>
+          </p:cNvPicPr>
+          <p:nvPr/>
+        </p:nvPicPr>
+        <p:blipFill rotWithShape="1">
+          <a:blip r:embed="rId3" cstate="screen">
+            <a:extLst>
+              <a:ext uri="{28A0092B-C50C-407E-A947-70E740481C1C}">
+                <a14:useLocalDpi xmlns:a14="http://schemas.microsoft.com/office/drawing/2010/main"/>
+              </a:ext>
+            </a:extLst>
+          </a:blip>
+          <a:srcRect l="13265" t="9091" r="3502" b="-1"/>
+          <a:stretch/>
+        </p:blipFill>
+        <p:spPr>
+          <a:xfrm>
+            <a:off x="6188417" y="2519476"/>
+            <a:ext cx="5422392" cy="3050100"/>
+          </a:xfrm>
+          <a:prstGeom prst="rect">
+            <a:avLst/>
+          </a:prstGeom>
+          <a:noFill/>
+        </p:spPr>
+      </p:pic>
     </p:spTree>
     <p:extLst>
       <p:ext uri="{BB962C8B-B14F-4D97-AF65-F5344CB8AC3E}">
-        <p14:creationId xmlns:p14="http://schemas.microsoft.com/office/powerpoint/2010/main" val="2105526607"/>
+        <p14:creationId xmlns:p14="http://schemas.microsoft.com/office/powerpoint/2010/main" val="299777696"/>
       </p:ext>
     </p:extLst>
   </p:cSld>
@@ -6359,7 +8314,7 @@
           <p:cNvPr id="2" name="Titel 1">
             <a:extLst>
               <a:ext uri="{FF2B5EF4-FFF2-40B4-BE49-F238E27FC236}">
-                <a16:creationId xmlns:a16="http://schemas.microsoft.com/office/drawing/2014/main" id="{864EB3EE-3ECA-1B65-C20D-C51756604294}"/>
+                <a16:creationId xmlns:a16="http://schemas.microsoft.com/office/drawing/2014/main" id="{C02C5318-1A1E-49D0-B2E2-A4B0FA9E8A40}"/>
               </a:ext>
             </a:extLst>
           </p:cNvPr>
@@ -6370,24 +8325,31 @@
             <p:ph type="title"/>
           </p:nvPr>
         </p:nvSpPr>
-        <p:spPr/>
-        <p:txBody>
-          <a:bodyPr/>
+        <p:spPr>
+          <a:xfrm>
+            <a:off x="581193" y="729658"/>
+            <a:ext cx="11029616" cy="988332"/>
+          </a:xfrm>
+        </p:spPr>
+        <p:txBody>
+          <a:bodyPr rtlCol="0" anchor="b">
+            <a:normAutofit/>
+          </a:bodyPr>
           <a:lstStyle/>
           <a:p>
             <a:r>
               <a:rPr lang="nl-NL" dirty="0"/>
-              <a:t>Onderzoek doen naar display screen</a:t>
-            </a:r>
-          </a:p>
-        </p:txBody>
-      </p:sp>
-      <p:sp>
-        <p:nvSpPr>
-          <p:cNvPr id="3" name="Tijdelijke aanduiding voor inhoud 2">
+              <a:t>Demo en uitbreiding bon printer</a:t>
+            </a:r>
+          </a:p>
+        </p:txBody>
+      </p:sp>
+      <p:sp>
+        <p:nvSpPr>
+          <p:cNvPr id="3" name="Subtitel 2">
             <a:extLst>
               <a:ext uri="{FF2B5EF4-FFF2-40B4-BE49-F238E27FC236}">
-                <a16:creationId xmlns:a16="http://schemas.microsoft.com/office/drawing/2014/main" id="{848A9941-4ECF-9806-E8DB-FDB1E009026C}"/>
+                <a16:creationId xmlns:a16="http://schemas.microsoft.com/office/drawing/2014/main" id="{48B6CF59-4E5B-494D-A2F7-97ADD01E6497}"/>
               </a:ext>
             </a:extLst>
           </p:cNvPr>
@@ -6395,22 +8357,140 @@
             <a:spLocks noGrp="1"/>
           </p:cNvSpPr>
           <p:nvPr>
-            <p:ph idx="1"/>
-          </p:nvPr>
-        </p:nvSpPr>
-        <p:spPr/>
-        <p:txBody>
-          <a:bodyPr/>
+            <p:ph sz="half" idx="1"/>
+          </p:nvPr>
+        </p:nvSpPr>
+        <p:spPr>
+          <a:xfrm>
+            <a:off x="581193" y="2228003"/>
+            <a:ext cx="5422390" cy="3633047"/>
+          </a:xfrm>
+        </p:spPr>
+        <p:txBody>
+          <a:bodyPr rtlCol="0" anchor="ctr">
+            <a:normAutofit fontScale="92500"/>
+          </a:bodyPr>
           <a:lstStyle/>
           <a:p>
-            <a:endParaRPr lang="nl-NL"/>
-          </a:p>
-        </p:txBody>
-      </p:sp>
+            <a:pPr marL="0" indent="0">
+              <a:buNone/>
+            </a:pPr>
+            <a:r>
+              <a:rPr lang="nl-NL" sz="1800" dirty="0">
+                <a:effectLst/>
+                <a:latin typeface="Aptos" panose="020B0004020202020204" pitchFamily="34" charset="0"/>
+                <a:ea typeface="Aptos" panose="020B0004020202020204" pitchFamily="34" charset="0"/>
+                <a:cs typeface="Arial" panose="020B0604020202020204" pitchFamily="34" charset="0"/>
+              </a:rPr>
+              <a:t>US 5:</a:t>
+            </a:r>
+          </a:p>
+          <a:p>
+            <a:pPr marL="0" indent="0">
+              <a:buNone/>
+            </a:pPr>
+            <a:r>
+              <a:rPr lang="nl-NL" sz="1800" dirty="0">
+                <a:effectLst/>
+                <a:latin typeface="Aptos" panose="020B0004020202020204" pitchFamily="34" charset="0"/>
+                <a:ea typeface="Aptos" panose="020B0004020202020204" pitchFamily="34" charset="0"/>
+                <a:cs typeface="Arial" panose="020B0604020202020204" pitchFamily="34" charset="0"/>
+              </a:rPr>
+              <a:t>Als gebruiker wil ik dat het gepinde bedrag en de datum en tijd op de bon staat zodat ik dit kan laten zien aan de bank mocht er iets fout  gaan met de transactie.</a:t>
+            </a:r>
+          </a:p>
+          <a:p>
+            <a:pPr marL="0" indent="0">
+              <a:buNone/>
+            </a:pPr>
+            <a:r>
+              <a:rPr lang="nl-NL" dirty="0">
+                <a:latin typeface="Aptos" panose="020B0004020202020204" pitchFamily="34" charset="0"/>
+                <a:cs typeface="Arial" panose="020B0604020202020204" pitchFamily="34" charset="0"/>
+              </a:rPr>
+              <a:t>Taken:</a:t>
+            </a:r>
+          </a:p>
+          <a:p>
+            <a:pPr marL="0" indent="0">
+              <a:buNone/>
+            </a:pPr>
+            <a:r>
+              <a:rPr lang="nl-NL" sz="1800" dirty="0">
+                <a:effectLst/>
+                <a:latin typeface="Aptos" panose="020B0004020202020204" pitchFamily="34" charset="0"/>
+                <a:ea typeface="Aptos" panose="020B0004020202020204" pitchFamily="34" charset="0"/>
+                <a:cs typeface="Arial" panose="020B0604020202020204" pitchFamily="34" charset="0"/>
+              </a:rPr>
+              <a:t>5.4 Het schrijven van een code die op de bon de afgeschreven saldo en de tijd van de transactie afdrukt.</a:t>
+            </a:r>
+          </a:p>
+          <a:p>
+            <a:pPr marL="0" indent="0">
+              <a:buNone/>
+            </a:pPr>
+            <a:endParaRPr lang="nl-NL" dirty="0"/>
+          </a:p>
+          <a:p>
+            <a:r>
+              <a:rPr lang="nl-NL" dirty="0"/>
+              <a:t>Demo bon printer</a:t>
+            </a:r>
+          </a:p>
+          <a:p>
+            <a:r>
+              <a:rPr lang="nl-NL" dirty="0"/>
+              <a:t>Bon aanpassingen</a:t>
+            </a:r>
+          </a:p>
+          <a:p>
+            <a:pPr marL="0" indent="0" rtl="0">
+              <a:buNone/>
+            </a:pPr>
+            <a:endParaRPr lang="nl-NL" dirty="0"/>
+          </a:p>
+        </p:txBody>
+      </p:sp>
+      <p:pic>
+        <p:nvPicPr>
+          <p:cNvPr id="7" name="Afbeelding 6" descr="Digitale verbindingen">
+            <a:extLst>
+              <a:ext uri="{FF2B5EF4-FFF2-40B4-BE49-F238E27FC236}">
+                <a16:creationId xmlns:a16="http://schemas.microsoft.com/office/drawing/2014/main" id="{3840F91C-EDD0-4D4E-A4AB-E6C77856C88C}"/>
+              </a:ext>
+            </a:extLst>
+          </p:cNvPr>
+          <p:cNvPicPr>
+            <a:picLocks noChangeAspect="1"/>
+          </p:cNvPicPr>
+          <p:nvPr/>
+        </p:nvPicPr>
+        <p:blipFill rotWithShape="1">
+          <a:blip r:embed="rId3" cstate="screen">
+            <a:extLst>
+              <a:ext uri="{28A0092B-C50C-407E-A947-70E740481C1C}">
+                <a14:useLocalDpi xmlns:a14="http://schemas.microsoft.com/office/drawing/2010/main"/>
+              </a:ext>
+            </a:extLst>
+          </a:blip>
+          <a:srcRect l="13265" t="9091" r="3502" b="-1"/>
+          <a:stretch/>
+        </p:blipFill>
+        <p:spPr>
+          <a:xfrm>
+            <a:off x="6188417" y="2519476"/>
+            <a:ext cx="5422392" cy="3050100"/>
+          </a:xfrm>
+          <a:prstGeom prst="rect">
+            <a:avLst/>
+          </a:prstGeom>
+          <a:noFill/>
+        </p:spPr>
+      </p:pic>
     </p:spTree>
     <p:extLst>
       <p:ext uri="{BB962C8B-B14F-4D97-AF65-F5344CB8AC3E}">
-        <p14:creationId xmlns:p14="http://schemas.microsoft.com/office/powerpoint/2010/main" val="2421282576"/>
+        <p14:creationId xmlns:p14="http://schemas.microsoft.com/office/powerpoint/2010/main" val="25392372"/>
       </p:ext>
     </p:extLst>
   </p:cSld>
@@ -6442,7 +8522,7 @@
           <p:cNvPr id="2" name="Titel 1">
             <a:extLst>
               <a:ext uri="{FF2B5EF4-FFF2-40B4-BE49-F238E27FC236}">
-                <a16:creationId xmlns:a16="http://schemas.microsoft.com/office/drawing/2014/main" id="{4B21B5DA-4F64-C136-FA1D-391F60A75B70}"/>
+                <a16:creationId xmlns:a16="http://schemas.microsoft.com/office/drawing/2014/main" id="{C02C5318-1A1E-49D0-B2E2-A4B0FA9E8A40}"/>
               </a:ext>
             </a:extLst>
           </p:cNvPr>
@@ -6453,11 +8533,19 @@
             <p:ph type="title"/>
           </p:nvPr>
         </p:nvSpPr>
-        <p:spPr/>
-        <p:txBody>
-          <a:bodyPr/>
+        <p:spPr>
+          <a:xfrm>
+            <a:off x="581193" y="729658"/>
+            <a:ext cx="11029616" cy="988332"/>
+          </a:xfrm>
+        </p:spPr>
+        <p:txBody>
+          <a:bodyPr rtlCol="0" anchor="b">
+            <a:normAutofit/>
+          </a:bodyPr>
           <a:lstStyle/>
           <a:p>
+            <a:pPr rtl="0"/>
             <a:r>
               <a:rPr lang="nl-NL" dirty="0"/>
               <a:t>Linux </a:t>
@@ -6472,10 +8560,10 @@
       </p:sp>
       <p:sp>
         <p:nvSpPr>
-          <p:cNvPr id="3" name="Tijdelijke aanduiding voor inhoud 2">
+          <p:cNvPr id="3" name="Subtitel 2">
             <a:extLst>
               <a:ext uri="{FF2B5EF4-FFF2-40B4-BE49-F238E27FC236}">
-                <a16:creationId xmlns:a16="http://schemas.microsoft.com/office/drawing/2014/main" id="{33E3F839-737D-070C-CCD5-D23B3ADC773A}"/>
+                <a16:creationId xmlns:a16="http://schemas.microsoft.com/office/drawing/2014/main" id="{48B6CF59-4E5B-494D-A2F7-97ADD01E6497}"/>
               </a:ext>
             </a:extLst>
           </p:cNvPr>
@@ -6483,22 +8571,68 @@
             <a:spLocks noGrp="1"/>
           </p:cNvSpPr>
           <p:nvPr>
-            <p:ph idx="1"/>
-          </p:nvPr>
-        </p:nvSpPr>
-        <p:spPr/>
-        <p:txBody>
-          <a:bodyPr/>
+            <p:ph sz="half" idx="1"/>
+          </p:nvPr>
+        </p:nvSpPr>
+        <p:spPr>
+          <a:xfrm>
+            <a:off x="581193" y="2228003"/>
+            <a:ext cx="5422390" cy="3633047"/>
+          </a:xfrm>
+        </p:spPr>
+        <p:txBody>
+          <a:bodyPr rtlCol="0" anchor="ctr">
+            <a:normAutofit/>
+          </a:bodyPr>
           <a:lstStyle/>
           <a:p>
-            <a:endParaRPr lang="nl-NL"/>
-          </a:p>
-        </p:txBody>
-      </p:sp>
+            <a:pPr marL="0" indent="0" rtl="0">
+              <a:buNone/>
+            </a:pPr>
+            <a:endParaRPr lang="nl-NL" dirty="0"/>
+          </a:p>
+        </p:txBody>
+      </p:sp>
+      <p:pic>
+        <p:nvPicPr>
+          <p:cNvPr id="7" name="Afbeelding 6" descr="Digitale verbindingen">
+            <a:extLst>
+              <a:ext uri="{FF2B5EF4-FFF2-40B4-BE49-F238E27FC236}">
+                <a16:creationId xmlns:a16="http://schemas.microsoft.com/office/drawing/2014/main" id="{3840F91C-EDD0-4D4E-A4AB-E6C77856C88C}"/>
+              </a:ext>
+            </a:extLst>
+          </p:cNvPr>
+          <p:cNvPicPr>
+            <a:picLocks noChangeAspect="1"/>
+          </p:cNvPicPr>
+          <p:nvPr/>
+        </p:nvPicPr>
+        <p:blipFill rotWithShape="1">
+          <a:blip r:embed="rId3" cstate="screen">
+            <a:extLst>
+              <a:ext uri="{28A0092B-C50C-407E-A947-70E740481C1C}">
+                <a14:useLocalDpi xmlns:a14="http://schemas.microsoft.com/office/drawing/2010/main"/>
+              </a:ext>
+            </a:extLst>
+          </a:blip>
+          <a:srcRect l="13265" t="9091" r="3502" b="-1"/>
+          <a:stretch/>
+        </p:blipFill>
+        <p:spPr>
+          <a:xfrm>
+            <a:off x="6188417" y="2519476"/>
+            <a:ext cx="5422392" cy="3050100"/>
+          </a:xfrm>
+          <a:prstGeom prst="rect">
+            <a:avLst/>
+          </a:prstGeom>
+          <a:noFill/>
+        </p:spPr>
+      </p:pic>
     </p:spTree>
     <p:extLst>
       <p:ext uri="{BB962C8B-B14F-4D97-AF65-F5344CB8AC3E}">
-        <p14:creationId xmlns:p14="http://schemas.microsoft.com/office/powerpoint/2010/main" val="2764880704"/>
+        <p14:creationId xmlns:p14="http://schemas.microsoft.com/office/powerpoint/2010/main" val="502681931"/>
       </p:ext>
     </p:extLst>
   </p:cSld>
@@ -6530,7 +8664,7 @@
           <p:cNvPr id="2" name="Titel 1">
             <a:extLst>
               <a:ext uri="{FF2B5EF4-FFF2-40B4-BE49-F238E27FC236}">
-                <a16:creationId xmlns:a16="http://schemas.microsoft.com/office/drawing/2014/main" id="{FC87ED4F-5A58-378C-D0D7-6D93E5ABF349}"/>
+                <a16:creationId xmlns:a16="http://schemas.microsoft.com/office/drawing/2014/main" id="{C02C5318-1A1E-49D0-B2E2-A4B0FA9E8A40}"/>
               </a:ext>
             </a:extLst>
           </p:cNvPr>
@@ -6541,11 +8675,19 @@
             <p:ph type="title"/>
           </p:nvPr>
         </p:nvSpPr>
-        <p:spPr/>
-        <p:txBody>
-          <a:bodyPr/>
+        <p:spPr>
+          <a:xfrm>
+            <a:off x="581193" y="729658"/>
+            <a:ext cx="11029616" cy="988332"/>
+          </a:xfrm>
+        </p:spPr>
+        <p:txBody>
+          <a:bodyPr rtlCol="0" anchor="b">
+            <a:normAutofit/>
+          </a:bodyPr>
           <a:lstStyle/>
           <a:p>
+            <a:pPr rtl="0"/>
             <a:r>
               <a:rPr lang="nl-NL" dirty="0"/>
               <a:t>Schets interface design</a:t>
@@ -6555,10 +8697,10 @@
       </p:sp>
       <p:sp>
         <p:nvSpPr>
-          <p:cNvPr id="3" name="Tijdelijke aanduiding voor inhoud 2">
+          <p:cNvPr id="3" name="Subtitel 2">
             <a:extLst>
               <a:ext uri="{FF2B5EF4-FFF2-40B4-BE49-F238E27FC236}">
-                <a16:creationId xmlns:a16="http://schemas.microsoft.com/office/drawing/2014/main" id="{58BADB6D-8A04-A7AB-0095-A396A7093B7E}"/>
+                <a16:creationId xmlns:a16="http://schemas.microsoft.com/office/drawing/2014/main" id="{48B6CF59-4E5B-494D-A2F7-97ADD01E6497}"/>
               </a:ext>
             </a:extLst>
           </p:cNvPr>
@@ -6566,22 +8708,118 @@
             <a:spLocks noGrp="1"/>
           </p:cNvSpPr>
           <p:nvPr>
-            <p:ph idx="1"/>
-          </p:nvPr>
-        </p:nvSpPr>
-        <p:spPr/>
-        <p:txBody>
-          <a:bodyPr/>
+            <p:ph sz="half" idx="1"/>
+          </p:nvPr>
+        </p:nvSpPr>
+        <p:spPr>
+          <a:xfrm>
+            <a:off x="581193" y="2228003"/>
+            <a:ext cx="5422390" cy="3633047"/>
+          </a:xfrm>
+        </p:spPr>
+        <p:txBody>
+          <a:bodyPr rtlCol="0" anchor="ctr">
+            <a:normAutofit/>
+          </a:bodyPr>
           <a:lstStyle/>
           <a:p>
-            <a:endParaRPr lang="nl-NL"/>
-          </a:p>
-        </p:txBody>
-      </p:sp>
+            <a:pPr marL="0" indent="0">
+              <a:buNone/>
+            </a:pPr>
+            <a:r>
+              <a:rPr lang="nl-NL" dirty="0"/>
+              <a:t>US 9:</a:t>
+            </a:r>
+          </a:p>
+          <a:p>
+            <a:pPr marL="0" indent="0">
+              <a:buNone/>
+            </a:pPr>
+            <a:r>
+              <a:rPr lang="nl-NL" sz="1800" dirty="0">
+                <a:effectLst/>
+                <a:latin typeface="Aptos" panose="020B0004020202020204" pitchFamily="34" charset="0"/>
+                <a:ea typeface="Aptos" panose="020B0004020202020204" pitchFamily="34" charset="0"/>
+                <a:cs typeface="Arial" panose="020B0604020202020204" pitchFamily="34" charset="0"/>
+              </a:rPr>
+              <a:t>Als gebruiker wil ik op een scherm kunnen zien wat ik aan het doen ben zodat ik kan zien wat ik aan het doen ben.</a:t>
+            </a:r>
+          </a:p>
+          <a:p>
+            <a:pPr marL="0" indent="0">
+              <a:buNone/>
+            </a:pPr>
+            <a:r>
+              <a:rPr lang="nl-NL" dirty="0">
+                <a:latin typeface="Aptos" panose="020B0004020202020204" pitchFamily="34" charset="0"/>
+                <a:cs typeface="Arial" panose="020B0604020202020204" pitchFamily="34" charset="0"/>
+              </a:rPr>
+              <a:t>Taak:</a:t>
+            </a:r>
+          </a:p>
+          <a:p>
+            <a:pPr marL="0" indent="0">
+              <a:buNone/>
+            </a:pPr>
+            <a:r>
+              <a:rPr lang="nl-NL" sz="1800" dirty="0">
+                <a:effectLst/>
+                <a:latin typeface="Aptos" panose="020B0004020202020204" pitchFamily="34" charset="0"/>
+                <a:ea typeface="Aptos" panose="020B0004020202020204" pitchFamily="34" charset="0"/>
+                <a:cs typeface="Arial" panose="020B0604020202020204" pitchFamily="34" charset="0"/>
+              </a:rPr>
+              <a:t>9.2 Een GUI ontwerpen.</a:t>
+            </a:r>
+            <a:endParaRPr lang="nl-NL" dirty="0"/>
+          </a:p>
+          <a:p>
+            <a:r>
+              <a:rPr lang="nl-NL" dirty="0"/>
+              <a:t>Opties laten zien</a:t>
+            </a:r>
+          </a:p>
+        </p:txBody>
+      </p:sp>
+      <p:pic>
+        <p:nvPicPr>
+          <p:cNvPr id="7" name="Afbeelding 6" descr="Digitale verbindingen">
+            <a:extLst>
+              <a:ext uri="{FF2B5EF4-FFF2-40B4-BE49-F238E27FC236}">
+                <a16:creationId xmlns:a16="http://schemas.microsoft.com/office/drawing/2014/main" id="{3840F91C-EDD0-4D4E-A4AB-E6C77856C88C}"/>
+              </a:ext>
+            </a:extLst>
+          </p:cNvPr>
+          <p:cNvPicPr>
+            <a:picLocks noChangeAspect="1"/>
+          </p:cNvPicPr>
+          <p:nvPr/>
+        </p:nvPicPr>
+        <p:blipFill rotWithShape="1">
+          <a:blip r:embed="rId3" cstate="screen">
+            <a:extLst>
+              <a:ext uri="{28A0092B-C50C-407E-A947-70E740481C1C}">
+                <a14:useLocalDpi xmlns:a14="http://schemas.microsoft.com/office/drawing/2010/main"/>
+              </a:ext>
+            </a:extLst>
+          </a:blip>
+          <a:srcRect l="13265" t="9091" r="3502" b="-1"/>
+          <a:stretch/>
+        </p:blipFill>
+        <p:spPr>
+          <a:xfrm>
+            <a:off x="6188417" y="2519476"/>
+            <a:ext cx="5422392" cy="3050100"/>
+          </a:xfrm>
+          <a:prstGeom prst="rect">
+            <a:avLst/>
+          </a:prstGeom>
+          <a:noFill/>
+        </p:spPr>
+      </p:pic>
     </p:spTree>
     <p:extLst>
       <p:ext uri="{BB962C8B-B14F-4D97-AF65-F5344CB8AC3E}">
-        <p14:creationId xmlns:p14="http://schemas.microsoft.com/office/powerpoint/2010/main" val="1250394767"/>
+        <p14:creationId xmlns:p14="http://schemas.microsoft.com/office/powerpoint/2010/main" val="2900437682"/>
       </p:ext>
     </p:extLst>
   </p:cSld>
@@ -6613,7 +8851,7 @@
           <p:cNvPr id="2" name="Titel 1">
             <a:extLst>
               <a:ext uri="{FF2B5EF4-FFF2-40B4-BE49-F238E27FC236}">
-                <a16:creationId xmlns:a16="http://schemas.microsoft.com/office/drawing/2014/main" id="{7705E55D-BF7A-DB5B-37E4-2EC9B458CBCC}"/>
+                <a16:creationId xmlns:a16="http://schemas.microsoft.com/office/drawing/2014/main" id="{C02C5318-1A1E-49D0-B2E2-A4B0FA9E8A40}"/>
               </a:ext>
             </a:extLst>
           </p:cNvPr>
@@ -6624,24 +8862,32 @@
             <p:ph type="title"/>
           </p:nvPr>
         </p:nvSpPr>
-        <p:spPr/>
-        <p:txBody>
-          <a:bodyPr/>
+        <p:spPr>
+          <a:xfrm>
+            <a:off x="581193" y="729658"/>
+            <a:ext cx="11029616" cy="988332"/>
+          </a:xfrm>
+        </p:spPr>
+        <p:txBody>
+          <a:bodyPr rtlCol="0" anchor="b">
+            <a:normAutofit/>
+          </a:bodyPr>
           <a:lstStyle/>
           <a:p>
+            <a:pPr rtl="0"/>
             <a:r>
               <a:rPr lang="nl-NL" dirty="0"/>
-              <a:t>Biljet onderzoek.</a:t>
-            </a:r>
-          </a:p>
-        </p:txBody>
-      </p:sp>
-      <p:sp>
-        <p:nvSpPr>
-          <p:cNvPr id="3" name="Tijdelijke aanduiding voor inhoud 2">
+              <a:t>Onderzoek doen naar display screen</a:t>
+            </a:r>
+          </a:p>
+        </p:txBody>
+      </p:sp>
+      <p:sp>
+        <p:nvSpPr>
+          <p:cNvPr id="3" name="Subtitel 2">
             <a:extLst>
               <a:ext uri="{FF2B5EF4-FFF2-40B4-BE49-F238E27FC236}">
-                <a16:creationId xmlns:a16="http://schemas.microsoft.com/office/drawing/2014/main" id="{4F33B92D-5D36-E4DB-8864-4BDFBE5847C5}"/>
+                <a16:creationId xmlns:a16="http://schemas.microsoft.com/office/drawing/2014/main" id="{48B6CF59-4E5B-494D-A2F7-97ADD01E6497}"/>
               </a:ext>
             </a:extLst>
           </p:cNvPr>
@@ -6649,22 +8895,124 @@
             <a:spLocks noGrp="1"/>
           </p:cNvSpPr>
           <p:nvPr>
-            <p:ph idx="1"/>
-          </p:nvPr>
-        </p:nvSpPr>
-        <p:spPr/>
-        <p:txBody>
-          <a:bodyPr/>
+            <p:ph sz="half" idx="1"/>
+          </p:nvPr>
+        </p:nvSpPr>
+        <p:spPr>
+          <a:xfrm>
+            <a:off x="581193" y="2228003"/>
+            <a:ext cx="5422390" cy="3633047"/>
+          </a:xfrm>
+        </p:spPr>
+        <p:txBody>
+          <a:bodyPr rtlCol="0" anchor="ctr">
+            <a:normAutofit/>
+          </a:bodyPr>
           <a:lstStyle/>
           <a:p>
-            <a:endParaRPr lang="nl-NL"/>
-          </a:p>
-        </p:txBody>
-      </p:sp>
+            <a:pPr marL="0" indent="0">
+              <a:buNone/>
+            </a:pPr>
+            <a:r>
+              <a:rPr lang="nl-NL" dirty="0"/>
+              <a:t>US 9:</a:t>
+            </a:r>
+          </a:p>
+          <a:p>
+            <a:pPr marL="0" indent="0">
+              <a:buNone/>
+            </a:pPr>
+            <a:r>
+              <a:rPr lang="nl-NL" sz="1800" dirty="0">
+                <a:effectLst/>
+                <a:latin typeface="Aptos" panose="020B0004020202020204" pitchFamily="34" charset="0"/>
+                <a:ea typeface="Aptos" panose="020B0004020202020204" pitchFamily="34" charset="0"/>
+                <a:cs typeface="Arial" panose="020B0604020202020204" pitchFamily="34" charset="0"/>
+              </a:rPr>
+              <a:t>Als gebruiker wil ik op een scherm kunnen zien wat ik aan het doen ben zodat ik kan zien wat ik aan het doen ben.</a:t>
+            </a:r>
+          </a:p>
+          <a:p>
+            <a:pPr marL="0" indent="0">
+              <a:buNone/>
+            </a:pPr>
+            <a:r>
+              <a:rPr lang="nl-NL" dirty="0">
+                <a:latin typeface="Aptos" panose="020B0004020202020204" pitchFamily="34" charset="0"/>
+                <a:cs typeface="Arial" panose="020B0604020202020204" pitchFamily="34" charset="0"/>
+              </a:rPr>
+              <a:t>Taak:</a:t>
+            </a:r>
+          </a:p>
+          <a:p>
+            <a:pPr marL="0" indent="0">
+              <a:buNone/>
+            </a:pPr>
+            <a:r>
+              <a:rPr lang="nl-NL" sz="1800" dirty="0">
+                <a:effectLst/>
+                <a:latin typeface="Aptos" panose="020B0004020202020204" pitchFamily="34" charset="0"/>
+                <a:ea typeface="Aptos" panose="020B0004020202020204" pitchFamily="34" charset="0"/>
+                <a:cs typeface="Arial" panose="020B0604020202020204" pitchFamily="34" charset="0"/>
+              </a:rPr>
+              <a:t>9.1 Onderzoek doen naar welk display scherm er gebruikt gaat worden.</a:t>
+            </a:r>
+            <a:endParaRPr lang="nl-NL" dirty="0"/>
+          </a:p>
+          <a:p>
+            <a:r>
+              <a:rPr lang="nl-NL" dirty="0"/>
+              <a:t>onderzoek gedaan</a:t>
+            </a:r>
+          </a:p>
+          <a:p>
+            <a:r>
+              <a:rPr lang="nl-NL" dirty="0"/>
+              <a:t>Resultaten volgende meet</a:t>
+            </a:r>
+          </a:p>
+        </p:txBody>
+      </p:sp>
+      <p:pic>
+        <p:nvPicPr>
+          <p:cNvPr id="7" name="Afbeelding 6" descr="Digitale verbindingen">
+            <a:extLst>
+              <a:ext uri="{FF2B5EF4-FFF2-40B4-BE49-F238E27FC236}">
+                <a16:creationId xmlns:a16="http://schemas.microsoft.com/office/drawing/2014/main" id="{3840F91C-EDD0-4D4E-A4AB-E6C77856C88C}"/>
+              </a:ext>
+            </a:extLst>
+          </p:cNvPr>
+          <p:cNvPicPr>
+            <a:picLocks noChangeAspect="1"/>
+          </p:cNvPicPr>
+          <p:nvPr/>
+        </p:nvPicPr>
+        <p:blipFill rotWithShape="1">
+          <a:blip r:embed="rId3" cstate="screen">
+            <a:extLst>
+              <a:ext uri="{28A0092B-C50C-407E-A947-70E740481C1C}">
+                <a14:useLocalDpi xmlns:a14="http://schemas.microsoft.com/office/drawing/2010/main"/>
+              </a:ext>
+            </a:extLst>
+          </a:blip>
+          <a:srcRect l="13265" t="9091" r="3502" b="-1"/>
+          <a:stretch/>
+        </p:blipFill>
+        <p:spPr>
+          <a:xfrm>
+            <a:off x="6188417" y="2519476"/>
+            <a:ext cx="5422392" cy="3050100"/>
+          </a:xfrm>
+          <a:prstGeom prst="rect">
+            <a:avLst/>
+          </a:prstGeom>
+          <a:noFill/>
+        </p:spPr>
+      </p:pic>
     </p:spTree>
     <p:extLst>
       <p:ext uri="{BB962C8B-B14F-4D97-AF65-F5344CB8AC3E}">
-        <p14:creationId xmlns:p14="http://schemas.microsoft.com/office/powerpoint/2010/main" val="1586859219"/>
+        <p14:creationId xmlns:p14="http://schemas.microsoft.com/office/powerpoint/2010/main" val="1854531911"/>
       </p:ext>
     </p:extLst>
   </p:cSld>

</xml_diff>